<commit_message>
updating H1B Slide deck
</commit_message>
<xml_diff>
--- a/H1B_Capstone/Summaries/Capstone_1_Presentations.pptx
+++ b/H1B_Capstone/Summaries/Capstone_1_Presentations.pptx
@@ -10,13 +10,17 @@
     <p:sldId id="258" r:id="rId4"/>
     <p:sldId id="260" r:id="rId5"/>
     <p:sldId id="261" r:id="rId6"/>
-    <p:sldId id="262" r:id="rId7"/>
-    <p:sldId id="263" r:id="rId8"/>
-    <p:sldId id="264" r:id="rId9"/>
-    <p:sldId id="265" r:id="rId10"/>
-    <p:sldId id="266" r:id="rId11"/>
-    <p:sldId id="267" r:id="rId12"/>
-    <p:sldId id="268" r:id="rId13"/>
+    <p:sldId id="269" r:id="rId7"/>
+    <p:sldId id="270" r:id="rId8"/>
+    <p:sldId id="272" r:id="rId9"/>
+    <p:sldId id="271" r:id="rId10"/>
+    <p:sldId id="264" r:id="rId11"/>
+    <p:sldId id="273" r:id="rId12"/>
+    <p:sldId id="265" r:id="rId13"/>
+    <p:sldId id="274" r:id="rId14"/>
+    <p:sldId id="266" r:id="rId15"/>
+    <p:sldId id="267" r:id="rId16"/>
+    <p:sldId id="268" r:id="rId17"/>
   </p:sldIdLst>
   <p:sldSz cx="12192000" cy="6858000"/>
   <p:notesSz cx="6858000" cy="9144000"/>
@@ -115,6 +119,11 @@
       </a:defRPr>
     </a:lvl9pPr>
   </p:defaultTextStyle>
+  <p:extLst>
+    <p:ext uri="{EFAFB233-063F-42B5-8137-9DF3F51BA10A}">
+      <p15:sldGuideLst xmlns:p15="http://schemas.microsoft.com/office/powerpoint/2012/main"/>
+    </p:ext>
+  </p:extLst>
 </p:presentation>
 </file>
 
@@ -265,7 +274,7 @@
           <a:p>
             <a:fld id="{3899AE7E-5801-40CB-B9B0-7F7814FF39B6}" type="datetimeFigureOut">
               <a:rPr lang="en-US" smtClean="0"/>
-              <a:t>5/28/2018</a:t>
+              <a:t>7/21/2018</a:t>
             </a:fld>
             <a:endParaRPr lang="en-US"/>
           </a:p>
@@ -463,7 +472,7 @@
           <a:p>
             <a:fld id="{3899AE7E-5801-40CB-B9B0-7F7814FF39B6}" type="datetimeFigureOut">
               <a:rPr lang="en-US" smtClean="0"/>
-              <a:t>5/28/2018</a:t>
+              <a:t>7/21/2018</a:t>
             </a:fld>
             <a:endParaRPr lang="en-US"/>
           </a:p>
@@ -671,7 +680,7 @@
           <a:p>
             <a:fld id="{3899AE7E-5801-40CB-B9B0-7F7814FF39B6}" type="datetimeFigureOut">
               <a:rPr lang="en-US" smtClean="0"/>
-              <a:t>5/28/2018</a:t>
+              <a:t>7/21/2018</a:t>
             </a:fld>
             <a:endParaRPr lang="en-US"/>
           </a:p>
@@ -869,7 +878,7 @@
           <a:p>
             <a:fld id="{3899AE7E-5801-40CB-B9B0-7F7814FF39B6}" type="datetimeFigureOut">
               <a:rPr lang="en-US" smtClean="0"/>
-              <a:t>5/28/2018</a:t>
+              <a:t>7/21/2018</a:t>
             </a:fld>
             <a:endParaRPr lang="en-US"/>
           </a:p>
@@ -1144,7 +1153,7 @@
           <a:p>
             <a:fld id="{3899AE7E-5801-40CB-B9B0-7F7814FF39B6}" type="datetimeFigureOut">
               <a:rPr lang="en-US" smtClean="0"/>
-              <a:t>5/28/2018</a:t>
+              <a:t>7/21/2018</a:t>
             </a:fld>
             <a:endParaRPr lang="en-US"/>
           </a:p>
@@ -1409,7 +1418,7 @@
           <a:p>
             <a:fld id="{3899AE7E-5801-40CB-B9B0-7F7814FF39B6}" type="datetimeFigureOut">
               <a:rPr lang="en-US" smtClean="0"/>
-              <a:t>5/28/2018</a:t>
+              <a:t>7/21/2018</a:t>
             </a:fld>
             <a:endParaRPr lang="en-US"/>
           </a:p>
@@ -1821,7 +1830,7 @@
           <a:p>
             <a:fld id="{3899AE7E-5801-40CB-B9B0-7F7814FF39B6}" type="datetimeFigureOut">
               <a:rPr lang="en-US" smtClean="0"/>
-              <a:t>5/28/2018</a:t>
+              <a:t>7/21/2018</a:t>
             </a:fld>
             <a:endParaRPr lang="en-US"/>
           </a:p>
@@ -1962,7 +1971,7 @@
           <a:p>
             <a:fld id="{3899AE7E-5801-40CB-B9B0-7F7814FF39B6}" type="datetimeFigureOut">
               <a:rPr lang="en-US" smtClean="0"/>
-              <a:t>5/28/2018</a:t>
+              <a:t>7/21/2018</a:t>
             </a:fld>
             <a:endParaRPr lang="en-US"/>
           </a:p>
@@ -2075,7 +2084,7 @@
           <a:p>
             <a:fld id="{3899AE7E-5801-40CB-B9B0-7F7814FF39B6}" type="datetimeFigureOut">
               <a:rPr lang="en-US" smtClean="0"/>
-              <a:t>5/28/2018</a:t>
+              <a:t>7/21/2018</a:t>
             </a:fld>
             <a:endParaRPr lang="en-US"/>
           </a:p>
@@ -2386,7 +2395,7 @@
           <a:p>
             <a:fld id="{3899AE7E-5801-40CB-B9B0-7F7814FF39B6}" type="datetimeFigureOut">
               <a:rPr lang="en-US" smtClean="0"/>
-              <a:t>5/28/2018</a:t>
+              <a:t>7/21/2018</a:t>
             </a:fld>
             <a:endParaRPr lang="en-US"/>
           </a:p>
@@ -2674,7 +2683,7 @@
           <a:p>
             <a:fld id="{3899AE7E-5801-40CB-B9B0-7F7814FF39B6}" type="datetimeFigureOut">
               <a:rPr lang="en-US" smtClean="0"/>
-              <a:t>5/28/2018</a:t>
+              <a:t>7/21/2018</a:t>
             </a:fld>
             <a:endParaRPr lang="en-US"/>
           </a:p>
@@ -2915,7 +2924,7 @@
           <a:p>
             <a:fld id="{3899AE7E-5801-40CB-B9B0-7F7814FF39B6}" type="datetimeFigureOut">
               <a:rPr lang="en-US" smtClean="0"/>
-              <a:t>5/28/2018</a:t>
+              <a:t>7/21/2018</a:t>
             </a:fld>
             <a:endParaRPr lang="en-US"/>
           </a:p>
@@ -3432,10 +3441,6 @@
           </p:nvPr>
         </p:nvSpPr>
         <p:spPr>
-          <a:xfrm>
-            <a:off x="838200" y="288925"/>
-            <a:ext cx="10515600" cy="1325563"/>
-          </a:xfrm>
           <a:solidFill>
             <a:schemeClr val="bg2"/>
           </a:solidFill>
@@ -3446,7 +3451,7 @@
           <a:p>
             <a:r>
               <a:rPr lang="en-US" dirty="0"/>
-              <a:t>t-SNE Plot</a:t>
+              <a:t>Classification Analysis</a:t>
             </a:r>
           </a:p>
         </p:txBody>
@@ -3467,83 +3472,156 @@
             <p:ph idx="1"/>
           </p:nvPr>
         </p:nvSpPr>
-        <p:spPr>
-          <a:xfrm>
-            <a:off x="1046243" y="2307496"/>
-            <a:ext cx="3814482" cy="3448517"/>
-          </a:xfrm>
-        </p:spPr>
+        <p:spPr/>
         <p:txBody>
           <a:bodyPr>
             <a:normAutofit/>
           </a:bodyPr>
           <a:lstStyle/>
           <a:p>
-            <a:r>
-              <a:rPr lang="en-US" sz="2400" dirty="0"/>
-              <a:t>Model very bad at predicting denied applications</a:t>
-            </a:r>
-          </a:p>
-          <a:p>
-            <a:r>
-              <a:rPr lang="en-US" sz="2400" dirty="0"/>
-              <a:t>Reduce data to two dimensions using t-SNE to visualize</a:t>
-            </a:r>
-          </a:p>
-          <a:p>
-            <a:r>
-              <a:rPr lang="en-US" sz="2400" dirty="0"/>
-              <a:t>Certified and Denied overlap almost completely</a:t>
-            </a:r>
-          </a:p>
-          <a:p>
-            <a:pPr marL="0" indent="0">
-              <a:buNone/>
-            </a:pPr>
+            <a:pPr lvl="1"/>
+            <a:r>
+              <a:rPr lang="en-US" dirty="0"/>
+              <a:t>SGD Classifier</a:t>
+            </a:r>
+          </a:p>
+          <a:p>
+            <a:pPr lvl="2"/>
+            <a:r>
+              <a:rPr lang="en-US" dirty="0"/>
+              <a:t>Hyperparameters: alpha, loss, penalty, </a:t>
+            </a:r>
+            <a:r>
+              <a:rPr lang="en-US" dirty="0" err="1"/>
+              <a:t>max_iter</a:t>
+            </a:r>
             <a:endParaRPr lang="en-US" dirty="0"/>
           </a:p>
-        </p:txBody>
-      </p:sp>
-      <p:pic>
-        <p:nvPicPr>
-          <p:cNvPr id="5" name="Picture 4">
-            <a:extLst>
-              <a:ext uri="{FF2B5EF4-FFF2-40B4-BE49-F238E27FC236}">
-                <a16:creationId xmlns:a16="http://schemas.microsoft.com/office/drawing/2014/main" id="{8DDCAF83-4D73-47F9-AFE5-0BCEBADD56C3}"/>
-              </a:ext>
-            </a:extLst>
-          </p:cNvPr>
-          <p:cNvPicPr>
-            <a:picLocks noChangeAspect="1"/>
-          </p:cNvPicPr>
-          <p:nvPr/>
-        </p:nvPicPr>
-        <p:blipFill>
-          <a:blip r:embed="rId2">
-            <a:extLst>
-              <a:ext uri="{28A0092B-C50C-407E-A947-70E740481C1C}">
-                <a14:useLocalDpi xmlns:a14="http://schemas.microsoft.com/office/drawing/2010/main" val="0"/>
-              </a:ext>
-            </a:extLst>
-          </a:blip>
-          <a:stretch>
-            <a:fillRect/>
-          </a:stretch>
-        </p:blipFill>
-        <p:spPr>
-          <a:xfrm>
-            <a:off x="5575090" y="1614488"/>
-            <a:ext cx="6043169" cy="4834535"/>
-          </a:xfrm>
-          <a:prstGeom prst="rect">
-            <a:avLst/>
-          </a:prstGeom>
-        </p:spPr>
-      </p:pic>
+          <a:p>
+            <a:pPr lvl="1"/>
+            <a:r>
+              <a:rPr lang="en-US" dirty="0"/>
+              <a:t>Features</a:t>
+            </a:r>
+          </a:p>
+          <a:p>
+            <a:pPr lvl="2"/>
+            <a:r>
+              <a:rPr lang="en-US" sz="1800" dirty="0"/>
+              <a:t>FULL_TIME_POSITION, PREVAILING_WAGE, SOC_NAME, </a:t>
+            </a:r>
+            <a:r>
+              <a:rPr lang="en-US" sz="1800" dirty="0" err="1"/>
+              <a:t>lon</a:t>
+            </a:r>
+            <a:r>
+              <a:rPr lang="en-US" sz="1800" dirty="0"/>
+              <a:t>, </a:t>
+            </a:r>
+            <a:r>
+              <a:rPr lang="en-US" sz="1800" dirty="0" err="1"/>
+              <a:t>lat</a:t>
+            </a:r>
+            <a:r>
+              <a:rPr lang="en-US" sz="1800" dirty="0"/>
+              <a:t>, </a:t>
+            </a:r>
+            <a:r>
+              <a:rPr lang="en-US" sz="1800" dirty="0" err="1"/>
+              <a:t>block_fis</a:t>
+            </a:r>
+            <a:r>
+              <a:rPr lang="en-US" sz="1800" dirty="0"/>
+              <a:t>, block_pop_2015, </a:t>
+            </a:r>
+            <a:r>
+              <a:rPr lang="en-US" sz="1800" dirty="0" err="1"/>
+              <a:t>county_fips</a:t>
+            </a:r>
+            <a:r>
+              <a:rPr lang="en-US" sz="1800" dirty="0"/>
+              <a:t>, </a:t>
+            </a:r>
+            <a:r>
+              <a:rPr lang="en-US" sz="1800" dirty="0" err="1"/>
+              <a:t>county_pop</a:t>
+            </a:r>
+            <a:r>
+              <a:rPr lang="en-US" sz="1800" dirty="0"/>
+              <a:t>, </a:t>
+            </a:r>
+            <a:r>
+              <a:rPr lang="en-US" sz="1800" dirty="0" err="1"/>
+              <a:t>state_code</a:t>
+            </a:r>
+            <a:endParaRPr lang="en-US" sz="1800" dirty="0"/>
+          </a:p>
+          <a:p>
+            <a:pPr lvl="2"/>
+            <a:r>
+              <a:rPr lang="en-US" dirty="0"/>
+              <a:t>Reduced the number of features as I proceeded through cross-validation</a:t>
+            </a:r>
+          </a:p>
+          <a:p>
+            <a:pPr lvl="1"/>
+            <a:r>
+              <a:rPr lang="en-US" dirty="0"/>
+              <a:t>Cross-validation</a:t>
+            </a:r>
+          </a:p>
+          <a:p>
+            <a:pPr lvl="2"/>
+            <a:r>
+              <a:rPr lang="en-US" dirty="0"/>
+              <a:t>Five-fold</a:t>
+            </a:r>
+          </a:p>
+          <a:p>
+            <a:pPr lvl="1"/>
+            <a:r>
+              <a:rPr lang="en-US" dirty="0"/>
+              <a:t>Other Parameters</a:t>
+            </a:r>
+          </a:p>
+          <a:p>
+            <a:pPr lvl="2"/>
+            <a:r>
+              <a:rPr lang="en-US" dirty="0"/>
+              <a:t>Kernel Approximation</a:t>
+            </a:r>
+          </a:p>
+          <a:p>
+            <a:pPr lvl="2"/>
+            <a:r>
+              <a:rPr lang="en-US" dirty="0"/>
+              <a:t>Imputation</a:t>
+            </a:r>
+          </a:p>
+          <a:p>
+            <a:pPr lvl="2"/>
+            <a:r>
+              <a:rPr lang="en-US" dirty="0"/>
+              <a:t>Intercept Fit</a:t>
+            </a:r>
+          </a:p>
+          <a:p>
+            <a:pPr lvl="2"/>
+            <a:endParaRPr lang="en-US" dirty="0"/>
+          </a:p>
+          <a:p>
+            <a:pPr lvl="1"/>
+            <a:endParaRPr lang="en-US" dirty="0"/>
+          </a:p>
+          <a:p>
+            <a:endParaRPr lang="en-US" dirty="0"/>
+          </a:p>
+        </p:txBody>
+      </p:sp>
     </p:spTree>
     <p:extLst>
       <p:ext uri="{BB962C8B-B14F-4D97-AF65-F5344CB8AC3E}">
-        <p14:creationId xmlns:p14="http://schemas.microsoft.com/office/powerpoint/2010/main" val="3999054109"/>
+        <p14:creationId xmlns:p14="http://schemas.microsoft.com/office/powerpoint/2010/main" val="677513240"/>
       </p:ext>
     </p:extLst>
   </p:cSld>
@@ -3597,7 +3675,7 @@
           <a:p>
             <a:r>
               <a:rPr lang="en-US" dirty="0"/>
-              <a:t>Conclusions</a:t>
+              <a:t>Classification Analysis</a:t>
             </a:r>
           </a:p>
         </p:txBody>
@@ -3628,21 +3706,68 @@
             <a:pPr lvl="1"/>
             <a:r>
               <a:rPr lang="en-US" dirty="0"/>
-              <a:t>Model essentially as good as a coin flip</a:t>
+              <a:t>SGD Classifier</a:t>
             </a:r>
           </a:p>
           <a:p>
             <a:pPr lvl="2"/>
             <a:r>
               <a:rPr lang="en-US" dirty="0"/>
-              <a:t>Bad at predicting denied applications</a:t>
+              <a:t>Hyperparameters: alpha, loss, penalty, </a:t>
+            </a:r>
+            <a:r>
+              <a:rPr lang="en-US" dirty="0" err="1"/>
+              <a:t>max_iter</a:t>
+            </a:r>
+            <a:endParaRPr lang="en-US" dirty="0"/>
+          </a:p>
+          <a:p>
+            <a:pPr lvl="1"/>
+            <a:r>
+              <a:rPr lang="en-US" dirty="0"/>
+              <a:t>Features</a:t>
             </a:r>
           </a:p>
           <a:p>
             <a:pPr lvl="2"/>
             <a:r>
+              <a:rPr lang="en-US" sz="1800" dirty="0"/>
+              <a:t>Full-time Position, Prevailing Wage, SOC_NAME, Latitude, Longitude, Census Block FIPS Code, Census Block Population, County FIPS code, County Population, Sate FIPS Code</a:t>
+            </a:r>
+          </a:p>
+          <a:p>
+            <a:pPr lvl="2"/>
+            <a:r>
               <a:rPr lang="en-US" dirty="0"/>
-              <a:t>Over 97.68% of LCAs are certified</a:t>
+              <a:t>Reduced the number of features as I proceeded through cross-validation</a:t>
+            </a:r>
+          </a:p>
+          <a:p>
+            <a:pPr lvl="2"/>
+            <a:r>
+              <a:rPr lang="en-US" dirty="0"/>
+              <a:t>Standardized all features</a:t>
+            </a:r>
+          </a:p>
+          <a:p>
+            <a:pPr lvl="1"/>
+            <a:r>
+              <a:rPr lang="en-US" dirty="0"/>
+              <a:t>Cross-validation</a:t>
+            </a:r>
+          </a:p>
+          <a:p>
+            <a:pPr lvl="2"/>
+            <a:r>
+              <a:rPr lang="en-US" dirty="0"/>
+              <a:t>Five-fold</a:t>
+            </a:r>
+          </a:p>
+          <a:p>
+            <a:pPr lvl="2"/>
+            <a:r>
+              <a:rPr lang="en-US" dirty="0"/>
+              <a:t>Subset of random 10,000 records</a:t>
             </a:r>
           </a:p>
           <a:p>
@@ -3651,66 +3776,504 @@
           </a:p>
           <a:p>
             <a:pPr lvl="1"/>
-            <a:r>
-              <a:rPr lang="en-US" dirty="0"/>
-              <a:t>How are applications scored in real life?</a:t>
-            </a:r>
-          </a:p>
-          <a:p>
-            <a:pPr marL="457200" lvl="1" indent="0">
-              <a:buNone/>
-            </a:pPr>
             <a:endParaRPr lang="en-US" dirty="0"/>
           </a:p>
           <a:p>
-            <a:pPr lvl="1"/>
-            <a:r>
-              <a:rPr lang="en-US" dirty="0"/>
-              <a:t>Possible that I am missing information </a:t>
-            </a:r>
-          </a:p>
-          <a:p>
-            <a:pPr lvl="2"/>
-            <a:r>
-              <a:rPr lang="en-US" dirty="0"/>
-              <a:t>Is there something missing that informs denied applications</a:t>
-            </a:r>
-          </a:p>
-          <a:p>
-            <a:pPr lvl="1"/>
             <a:endParaRPr lang="en-US" dirty="0"/>
           </a:p>
-          <a:p>
-            <a:pPr lvl="1"/>
-            <a:r>
-              <a:rPr lang="en-US" dirty="0"/>
-              <a:t>Is completeness a factor?</a:t>
-            </a:r>
-          </a:p>
-          <a:p>
-            <a:pPr lvl="2"/>
-            <a:r>
-              <a:rPr lang="en-US" dirty="0"/>
-              <a:t>Are the fields I’m missing NULL for my denied records?</a:t>
-            </a:r>
-          </a:p>
-          <a:p>
-            <a:pPr lvl="2"/>
-            <a:endParaRPr lang="en-US" dirty="0"/>
-          </a:p>
-          <a:p>
-            <a:pPr lvl="1"/>
-            <a:endParaRPr lang="en-US" dirty="0"/>
-          </a:p>
-          <a:p>
-            <a:endParaRPr lang="en-US" dirty="0"/>
-          </a:p>
-        </p:txBody>
-      </p:sp>
+        </p:txBody>
+      </p:sp>
+      <p:grpSp>
+        <p:nvGrpSpPr>
+          <p:cNvPr id="7" name="Group 6">
+            <a:extLst>
+              <a:ext uri="{FF2B5EF4-FFF2-40B4-BE49-F238E27FC236}">
+                <a16:creationId xmlns:a16="http://schemas.microsoft.com/office/drawing/2014/main" id="{63316D4F-F9DE-4283-8B48-036F39FE35D7}"/>
+              </a:ext>
+            </a:extLst>
+          </p:cNvPr>
+          <p:cNvGrpSpPr/>
+          <p:nvPr/>
+        </p:nvGrpSpPr>
+        <p:grpSpPr>
+          <a:xfrm>
+            <a:off x="5577012" y="4142064"/>
+            <a:ext cx="5684509" cy="2421506"/>
+            <a:chOff x="5669291" y="3890394"/>
+            <a:chExt cx="5684509" cy="2421506"/>
+          </a:xfrm>
+        </p:grpSpPr>
+        <p:sp>
+          <p:nvSpPr>
+            <p:cNvPr id="5" name="Content Placeholder 2">
+              <a:extLst>
+                <a:ext uri="{FF2B5EF4-FFF2-40B4-BE49-F238E27FC236}">
+                  <a16:creationId xmlns:a16="http://schemas.microsoft.com/office/drawing/2014/main" id="{A605E8D7-70CE-49FE-9DC4-7A619364934D}"/>
+                </a:ext>
+              </a:extLst>
+            </p:cNvPr>
+            <p:cNvSpPr txBox="1">
+              <a:spLocks/>
+            </p:cNvSpPr>
+            <p:nvPr/>
+          </p:nvSpPr>
+          <p:spPr>
+            <a:xfrm>
+              <a:off x="5669291" y="3890394"/>
+              <a:ext cx="4774250" cy="1797341"/>
+            </a:xfrm>
+            <a:prstGeom prst="rect">
+              <a:avLst/>
+            </a:prstGeom>
+          </p:spPr>
+          <p:txBody>
+            <a:bodyPr vert="horz" lIns="91440" tIns="45720" rIns="91440" bIns="45720" rtlCol="0">
+              <a:normAutofit/>
+            </a:bodyPr>
+            <a:lstStyle>
+              <a:lvl1pPr marL="228600" indent="-228600" algn="l" defTabSz="914400" rtl="0" eaLnBrk="1" latinLnBrk="0" hangingPunct="1">
+                <a:lnSpc>
+                  <a:spcPct val="90000"/>
+                </a:lnSpc>
+                <a:spcBef>
+                  <a:spcPts val="1000"/>
+                </a:spcBef>
+                <a:buFont typeface="Arial" panose="020B0604020202020204" pitchFamily="34" charset="0"/>
+                <a:buChar char="•"/>
+                <a:defRPr sz="2800" kern="1200">
+                  <a:solidFill>
+                    <a:schemeClr val="tx1"/>
+                  </a:solidFill>
+                  <a:latin typeface="+mn-lt"/>
+                  <a:ea typeface="+mn-ea"/>
+                  <a:cs typeface="+mn-cs"/>
+                </a:defRPr>
+              </a:lvl1pPr>
+              <a:lvl2pPr marL="685800" indent="-228600" algn="l" defTabSz="914400" rtl="0" eaLnBrk="1" latinLnBrk="0" hangingPunct="1">
+                <a:lnSpc>
+                  <a:spcPct val="90000"/>
+                </a:lnSpc>
+                <a:spcBef>
+                  <a:spcPts val="500"/>
+                </a:spcBef>
+                <a:buFont typeface="Arial" panose="020B0604020202020204" pitchFamily="34" charset="0"/>
+                <a:buChar char="•"/>
+                <a:defRPr sz="2400" kern="1200">
+                  <a:solidFill>
+                    <a:schemeClr val="tx1"/>
+                  </a:solidFill>
+                  <a:latin typeface="+mn-lt"/>
+                  <a:ea typeface="+mn-ea"/>
+                  <a:cs typeface="+mn-cs"/>
+                </a:defRPr>
+              </a:lvl2pPr>
+              <a:lvl3pPr marL="1143000" indent="-228600" algn="l" defTabSz="914400" rtl="0" eaLnBrk="1" latinLnBrk="0" hangingPunct="1">
+                <a:lnSpc>
+                  <a:spcPct val="90000"/>
+                </a:lnSpc>
+                <a:spcBef>
+                  <a:spcPts val="500"/>
+                </a:spcBef>
+                <a:buFont typeface="Arial" panose="020B0604020202020204" pitchFamily="34" charset="0"/>
+                <a:buChar char="•"/>
+                <a:defRPr sz="2000" kern="1200">
+                  <a:solidFill>
+                    <a:schemeClr val="tx1"/>
+                  </a:solidFill>
+                  <a:latin typeface="+mn-lt"/>
+                  <a:ea typeface="+mn-ea"/>
+                  <a:cs typeface="+mn-cs"/>
+                </a:defRPr>
+              </a:lvl3pPr>
+              <a:lvl4pPr marL="1600200" indent="-228600" algn="l" defTabSz="914400" rtl="0" eaLnBrk="1" latinLnBrk="0" hangingPunct="1">
+                <a:lnSpc>
+                  <a:spcPct val="90000"/>
+                </a:lnSpc>
+                <a:spcBef>
+                  <a:spcPts val="500"/>
+                </a:spcBef>
+                <a:buFont typeface="Arial" panose="020B0604020202020204" pitchFamily="34" charset="0"/>
+                <a:buChar char="•"/>
+                <a:defRPr sz="1800" kern="1200">
+                  <a:solidFill>
+                    <a:schemeClr val="tx1"/>
+                  </a:solidFill>
+                  <a:latin typeface="+mn-lt"/>
+                  <a:ea typeface="+mn-ea"/>
+                  <a:cs typeface="+mn-cs"/>
+                </a:defRPr>
+              </a:lvl4pPr>
+              <a:lvl5pPr marL="2057400" indent="-228600" algn="l" defTabSz="914400" rtl="0" eaLnBrk="1" latinLnBrk="0" hangingPunct="1">
+                <a:lnSpc>
+                  <a:spcPct val="90000"/>
+                </a:lnSpc>
+                <a:spcBef>
+                  <a:spcPts val="500"/>
+                </a:spcBef>
+                <a:buFont typeface="Arial" panose="020B0604020202020204" pitchFamily="34" charset="0"/>
+                <a:buChar char="•"/>
+                <a:defRPr sz="1800" kern="1200">
+                  <a:solidFill>
+                    <a:schemeClr val="tx1"/>
+                  </a:solidFill>
+                  <a:latin typeface="+mn-lt"/>
+                  <a:ea typeface="+mn-ea"/>
+                  <a:cs typeface="+mn-cs"/>
+                </a:defRPr>
+              </a:lvl5pPr>
+              <a:lvl6pPr marL="2514600" indent="-228600" algn="l" defTabSz="914400" rtl="0" eaLnBrk="1" latinLnBrk="0" hangingPunct="1">
+                <a:lnSpc>
+                  <a:spcPct val="90000"/>
+                </a:lnSpc>
+                <a:spcBef>
+                  <a:spcPts val="500"/>
+                </a:spcBef>
+                <a:buFont typeface="Arial" panose="020B0604020202020204" pitchFamily="34" charset="0"/>
+                <a:buChar char="•"/>
+                <a:defRPr sz="1800" kern="1200">
+                  <a:solidFill>
+                    <a:schemeClr val="tx1"/>
+                  </a:solidFill>
+                  <a:latin typeface="+mn-lt"/>
+                  <a:ea typeface="+mn-ea"/>
+                  <a:cs typeface="+mn-cs"/>
+                </a:defRPr>
+              </a:lvl6pPr>
+              <a:lvl7pPr marL="2971800" indent="-228600" algn="l" defTabSz="914400" rtl="0" eaLnBrk="1" latinLnBrk="0" hangingPunct="1">
+                <a:lnSpc>
+                  <a:spcPct val="90000"/>
+                </a:lnSpc>
+                <a:spcBef>
+                  <a:spcPts val="500"/>
+                </a:spcBef>
+                <a:buFont typeface="Arial" panose="020B0604020202020204" pitchFamily="34" charset="0"/>
+                <a:buChar char="•"/>
+                <a:defRPr sz="1800" kern="1200">
+                  <a:solidFill>
+                    <a:schemeClr val="tx1"/>
+                  </a:solidFill>
+                  <a:latin typeface="+mn-lt"/>
+                  <a:ea typeface="+mn-ea"/>
+                  <a:cs typeface="+mn-cs"/>
+                </a:defRPr>
+              </a:lvl7pPr>
+              <a:lvl8pPr marL="3429000" indent="-228600" algn="l" defTabSz="914400" rtl="0" eaLnBrk="1" latinLnBrk="0" hangingPunct="1">
+                <a:lnSpc>
+                  <a:spcPct val="90000"/>
+                </a:lnSpc>
+                <a:spcBef>
+                  <a:spcPts val="500"/>
+                </a:spcBef>
+                <a:buFont typeface="Arial" panose="020B0604020202020204" pitchFamily="34" charset="0"/>
+                <a:buChar char="•"/>
+                <a:defRPr sz="1800" kern="1200">
+                  <a:solidFill>
+                    <a:schemeClr val="tx1"/>
+                  </a:solidFill>
+                  <a:latin typeface="+mn-lt"/>
+                  <a:ea typeface="+mn-ea"/>
+                  <a:cs typeface="+mn-cs"/>
+                </a:defRPr>
+              </a:lvl8pPr>
+              <a:lvl9pPr marL="3886200" indent="-228600" algn="l" defTabSz="914400" rtl="0" eaLnBrk="1" latinLnBrk="0" hangingPunct="1">
+                <a:lnSpc>
+                  <a:spcPct val="90000"/>
+                </a:lnSpc>
+                <a:spcBef>
+                  <a:spcPts val="500"/>
+                </a:spcBef>
+                <a:buFont typeface="Arial" panose="020B0604020202020204" pitchFamily="34" charset="0"/>
+                <a:buChar char="•"/>
+                <a:defRPr sz="1800" kern="1200">
+                  <a:solidFill>
+                    <a:schemeClr val="tx1"/>
+                  </a:solidFill>
+                  <a:latin typeface="+mn-lt"/>
+                  <a:ea typeface="+mn-ea"/>
+                  <a:cs typeface="+mn-cs"/>
+                </a:defRPr>
+              </a:lvl9pPr>
+            </a:lstStyle>
+            <a:p>
+              <a:pPr lvl="1"/>
+              <a:r>
+                <a:rPr lang="en-US" dirty="0"/>
+                <a:t>Hyper Parameters</a:t>
+              </a:r>
+            </a:p>
+            <a:p>
+              <a:pPr lvl="2"/>
+              <a:r>
+                <a:rPr lang="en-US" dirty="0"/>
+                <a:t>Alpha</a:t>
+              </a:r>
+            </a:p>
+            <a:p>
+              <a:pPr lvl="2"/>
+              <a:r>
+                <a:rPr lang="en-US" dirty="0"/>
+                <a:t>Loss Function</a:t>
+              </a:r>
+            </a:p>
+            <a:p>
+              <a:pPr lvl="2"/>
+              <a:r>
+                <a:rPr lang="en-US" dirty="0"/>
+                <a:t>Number of Epochs</a:t>
+              </a:r>
+            </a:p>
+            <a:p>
+              <a:pPr lvl="2"/>
+              <a:r>
+                <a:rPr lang="en-US" dirty="0"/>
+                <a:t>Penalty</a:t>
+              </a:r>
+            </a:p>
+            <a:p>
+              <a:pPr marL="914400" lvl="2" indent="0">
+                <a:buNone/>
+              </a:pPr>
+              <a:endParaRPr lang="en-US" dirty="0"/>
+            </a:p>
+            <a:p>
+              <a:pPr lvl="1"/>
+              <a:endParaRPr lang="en-US" dirty="0"/>
+            </a:p>
+            <a:p>
+              <a:endParaRPr lang="en-US" dirty="0"/>
+            </a:p>
+          </p:txBody>
+        </p:sp>
+        <p:sp>
+          <p:nvSpPr>
+            <p:cNvPr id="6" name="Content Placeholder 2">
+              <a:extLst>
+                <a:ext uri="{FF2B5EF4-FFF2-40B4-BE49-F238E27FC236}">
+                  <a16:creationId xmlns:a16="http://schemas.microsoft.com/office/drawing/2014/main" id="{C03178A7-4E33-4A23-8F22-69BA4AECBF1C}"/>
+                </a:ext>
+              </a:extLst>
+            </p:cNvPr>
+            <p:cNvSpPr txBox="1">
+              <a:spLocks/>
+            </p:cNvSpPr>
+            <p:nvPr/>
+          </p:nvSpPr>
+          <p:spPr>
+            <a:xfrm>
+              <a:off x="8114251" y="4357470"/>
+              <a:ext cx="3239549" cy="1954430"/>
+            </a:xfrm>
+            <a:prstGeom prst="rect">
+              <a:avLst/>
+            </a:prstGeom>
+          </p:spPr>
+          <p:txBody>
+            <a:bodyPr vert="horz" lIns="91440" tIns="45720" rIns="91440" bIns="45720" rtlCol="0">
+              <a:normAutofit/>
+            </a:bodyPr>
+            <a:lstStyle>
+              <a:lvl1pPr marL="228600" indent="-228600" algn="l" defTabSz="914400" rtl="0" eaLnBrk="1" latinLnBrk="0" hangingPunct="1">
+                <a:lnSpc>
+                  <a:spcPct val="90000"/>
+                </a:lnSpc>
+                <a:spcBef>
+                  <a:spcPts val="1000"/>
+                </a:spcBef>
+                <a:buFont typeface="Arial" panose="020B0604020202020204" pitchFamily="34" charset="0"/>
+                <a:buChar char="•"/>
+                <a:defRPr sz="2800" kern="1200">
+                  <a:solidFill>
+                    <a:schemeClr val="tx1"/>
+                  </a:solidFill>
+                  <a:latin typeface="+mn-lt"/>
+                  <a:ea typeface="+mn-ea"/>
+                  <a:cs typeface="+mn-cs"/>
+                </a:defRPr>
+              </a:lvl1pPr>
+              <a:lvl2pPr marL="685800" indent="-228600" algn="l" defTabSz="914400" rtl="0" eaLnBrk="1" latinLnBrk="0" hangingPunct="1">
+                <a:lnSpc>
+                  <a:spcPct val="90000"/>
+                </a:lnSpc>
+                <a:spcBef>
+                  <a:spcPts val="500"/>
+                </a:spcBef>
+                <a:buFont typeface="Arial" panose="020B0604020202020204" pitchFamily="34" charset="0"/>
+                <a:buChar char="•"/>
+                <a:defRPr sz="2400" kern="1200">
+                  <a:solidFill>
+                    <a:schemeClr val="tx1"/>
+                  </a:solidFill>
+                  <a:latin typeface="+mn-lt"/>
+                  <a:ea typeface="+mn-ea"/>
+                  <a:cs typeface="+mn-cs"/>
+                </a:defRPr>
+              </a:lvl2pPr>
+              <a:lvl3pPr marL="1143000" indent="-228600" algn="l" defTabSz="914400" rtl="0" eaLnBrk="1" latinLnBrk="0" hangingPunct="1">
+                <a:lnSpc>
+                  <a:spcPct val="90000"/>
+                </a:lnSpc>
+                <a:spcBef>
+                  <a:spcPts val="500"/>
+                </a:spcBef>
+                <a:buFont typeface="Arial" panose="020B0604020202020204" pitchFamily="34" charset="0"/>
+                <a:buChar char="•"/>
+                <a:defRPr sz="2000" kern="1200">
+                  <a:solidFill>
+                    <a:schemeClr val="tx1"/>
+                  </a:solidFill>
+                  <a:latin typeface="+mn-lt"/>
+                  <a:ea typeface="+mn-ea"/>
+                  <a:cs typeface="+mn-cs"/>
+                </a:defRPr>
+              </a:lvl3pPr>
+              <a:lvl4pPr marL="1600200" indent="-228600" algn="l" defTabSz="914400" rtl="0" eaLnBrk="1" latinLnBrk="0" hangingPunct="1">
+                <a:lnSpc>
+                  <a:spcPct val="90000"/>
+                </a:lnSpc>
+                <a:spcBef>
+                  <a:spcPts val="500"/>
+                </a:spcBef>
+                <a:buFont typeface="Arial" panose="020B0604020202020204" pitchFamily="34" charset="0"/>
+                <a:buChar char="•"/>
+                <a:defRPr sz="1800" kern="1200">
+                  <a:solidFill>
+                    <a:schemeClr val="tx1"/>
+                  </a:solidFill>
+                  <a:latin typeface="+mn-lt"/>
+                  <a:ea typeface="+mn-ea"/>
+                  <a:cs typeface="+mn-cs"/>
+                </a:defRPr>
+              </a:lvl4pPr>
+              <a:lvl5pPr marL="2057400" indent="-228600" algn="l" defTabSz="914400" rtl="0" eaLnBrk="1" latinLnBrk="0" hangingPunct="1">
+                <a:lnSpc>
+                  <a:spcPct val="90000"/>
+                </a:lnSpc>
+                <a:spcBef>
+                  <a:spcPts val="500"/>
+                </a:spcBef>
+                <a:buFont typeface="Arial" panose="020B0604020202020204" pitchFamily="34" charset="0"/>
+                <a:buChar char="•"/>
+                <a:defRPr sz="1800" kern="1200">
+                  <a:solidFill>
+                    <a:schemeClr val="tx1"/>
+                  </a:solidFill>
+                  <a:latin typeface="+mn-lt"/>
+                  <a:ea typeface="+mn-ea"/>
+                  <a:cs typeface="+mn-cs"/>
+                </a:defRPr>
+              </a:lvl5pPr>
+              <a:lvl6pPr marL="2514600" indent="-228600" algn="l" defTabSz="914400" rtl="0" eaLnBrk="1" latinLnBrk="0" hangingPunct="1">
+                <a:lnSpc>
+                  <a:spcPct val="90000"/>
+                </a:lnSpc>
+                <a:spcBef>
+                  <a:spcPts val="500"/>
+                </a:spcBef>
+                <a:buFont typeface="Arial" panose="020B0604020202020204" pitchFamily="34" charset="0"/>
+                <a:buChar char="•"/>
+                <a:defRPr sz="1800" kern="1200">
+                  <a:solidFill>
+                    <a:schemeClr val="tx1"/>
+                  </a:solidFill>
+                  <a:latin typeface="+mn-lt"/>
+                  <a:ea typeface="+mn-ea"/>
+                  <a:cs typeface="+mn-cs"/>
+                </a:defRPr>
+              </a:lvl6pPr>
+              <a:lvl7pPr marL="2971800" indent="-228600" algn="l" defTabSz="914400" rtl="0" eaLnBrk="1" latinLnBrk="0" hangingPunct="1">
+                <a:lnSpc>
+                  <a:spcPct val="90000"/>
+                </a:lnSpc>
+                <a:spcBef>
+                  <a:spcPts val="500"/>
+                </a:spcBef>
+                <a:buFont typeface="Arial" panose="020B0604020202020204" pitchFamily="34" charset="0"/>
+                <a:buChar char="•"/>
+                <a:defRPr sz="1800" kern="1200">
+                  <a:solidFill>
+                    <a:schemeClr val="tx1"/>
+                  </a:solidFill>
+                  <a:latin typeface="+mn-lt"/>
+                  <a:ea typeface="+mn-ea"/>
+                  <a:cs typeface="+mn-cs"/>
+                </a:defRPr>
+              </a:lvl7pPr>
+              <a:lvl8pPr marL="3429000" indent="-228600" algn="l" defTabSz="914400" rtl="0" eaLnBrk="1" latinLnBrk="0" hangingPunct="1">
+                <a:lnSpc>
+                  <a:spcPct val="90000"/>
+                </a:lnSpc>
+                <a:spcBef>
+                  <a:spcPts val="500"/>
+                </a:spcBef>
+                <a:buFont typeface="Arial" panose="020B0604020202020204" pitchFamily="34" charset="0"/>
+                <a:buChar char="•"/>
+                <a:defRPr sz="1800" kern="1200">
+                  <a:solidFill>
+                    <a:schemeClr val="tx1"/>
+                  </a:solidFill>
+                  <a:latin typeface="+mn-lt"/>
+                  <a:ea typeface="+mn-ea"/>
+                  <a:cs typeface="+mn-cs"/>
+                </a:defRPr>
+              </a:lvl8pPr>
+              <a:lvl9pPr marL="3886200" indent="-228600" algn="l" defTabSz="914400" rtl="0" eaLnBrk="1" latinLnBrk="0" hangingPunct="1">
+                <a:lnSpc>
+                  <a:spcPct val="90000"/>
+                </a:lnSpc>
+                <a:spcBef>
+                  <a:spcPts val="500"/>
+                </a:spcBef>
+                <a:buFont typeface="Arial" panose="020B0604020202020204" pitchFamily="34" charset="0"/>
+                <a:buChar char="•"/>
+                <a:defRPr sz="1800" kern="1200">
+                  <a:solidFill>
+                    <a:schemeClr val="tx1"/>
+                  </a:solidFill>
+                  <a:latin typeface="+mn-lt"/>
+                  <a:ea typeface="+mn-ea"/>
+                  <a:cs typeface="+mn-cs"/>
+                </a:defRPr>
+              </a:lvl9pPr>
+            </a:lstStyle>
+            <a:p>
+              <a:pPr lvl="2"/>
+              <a:r>
+                <a:rPr lang="en-US" dirty="0"/>
+                <a:t>Kernel Approximation</a:t>
+              </a:r>
+            </a:p>
+            <a:p>
+              <a:pPr lvl="2"/>
+              <a:r>
+                <a:rPr lang="en-US" dirty="0"/>
+                <a:t>Intercept Fit</a:t>
+              </a:r>
+            </a:p>
+            <a:p>
+              <a:pPr lvl="2"/>
+              <a:r>
+                <a:rPr lang="en-US" dirty="0"/>
+                <a:t>Class Weights</a:t>
+              </a:r>
+            </a:p>
+            <a:p>
+              <a:pPr lvl="2"/>
+              <a:endParaRPr lang="en-US" dirty="0"/>
+            </a:p>
+            <a:p>
+              <a:pPr lvl="1"/>
+              <a:endParaRPr lang="en-US" dirty="0"/>
+            </a:p>
+            <a:p>
+              <a:endParaRPr lang="en-US" dirty="0"/>
+            </a:p>
+          </p:txBody>
+        </p:sp>
+      </p:grpSp>
     </p:spTree>
     <p:extLst>
       <p:ext uri="{BB962C8B-B14F-4D97-AF65-F5344CB8AC3E}">
-        <p14:creationId xmlns:p14="http://schemas.microsoft.com/office/powerpoint/2010/main" val="3704780054"/>
+        <p14:creationId xmlns:p14="http://schemas.microsoft.com/office/powerpoint/2010/main" val="3285399064"/>
       </p:ext>
     </p:extLst>
   </p:cSld>
@@ -3721,1296 +4284,6 @@
 </file>
 
 <file path=ppt/slides/slide12.xml><?xml version="1.0" encoding="utf-8"?>
-<p:sld xmlns:a="http://schemas.openxmlformats.org/drawingml/2006/main" xmlns:r="http://schemas.openxmlformats.org/officeDocument/2006/relationships" xmlns:p="http://schemas.openxmlformats.org/presentationml/2006/main">
-  <p:cSld>
-    <p:spTree>
-      <p:nvGrpSpPr>
-        <p:cNvPr id="1" name=""/>
-        <p:cNvGrpSpPr/>
-        <p:nvPr/>
-      </p:nvGrpSpPr>
-      <p:grpSpPr>
-        <a:xfrm>
-          <a:off x="0" y="0"/>
-          <a:ext cx="0" cy="0"/>
-          <a:chOff x="0" y="0"/>
-          <a:chExt cx="0" cy="0"/>
-        </a:xfrm>
-      </p:grpSpPr>
-      <p:sp>
-        <p:nvSpPr>
-          <p:cNvPr id="2" name="Title 1">
-            <a:extLst>
-              <a:ext uri="{FF2B5EF4-FFF2-40B4-BE49-F238E27FC236}">
-                <a16:creationId xmlns:a16="http://schemas.microsoft.com/office/drawing/2014/main" id="{E08EC189-B582-4F74-9FE8-A516F8813C47}"/>
-              </a:ext>
-            </a:extLst>
-          </p:cNvPr>
-          <p:cNvSpPr>
-            <a:spLocks noGrp="1"/>
-          </p:cNvSpPr>
-          <p:nvPr>
-            <p:ph type="title"/>
-          </p:nvPr>
-        </p:nvSpPr>
-        <p:spPr>
-          <a:solidFill>
-            <a:schemeClr val="bg2"/>
-          </a:solidFill>
-        </p:spPr>
-        <p:txBody>
-          <a:bodyPr/>
-          <a:lstStyle/>
-          <a:p>
-            <a:r>
-              <a:rPr lang="en-US" dirty="0"/>
-              <a:t>Git Repository</a:t>
-            </a:r>
-          </a:p>
-        </p:txBody>
-      </p:sp>
-      <p:sp>
-        <p:nvSpPr>
-          <p:cNvPr id="3" name="Content Placeholder 2">
-            <a:extLst>
-              <a:ext uri="{FF2B5EF4-FFF2-40B4-BE49-F238E27FC236}">
-                <a16:creationId xmlns:a16="http://schemas.microsoft.com/office/drawing/2014/main" id="{53B4F6B9-6E6C-4FD7-A9D0-825EE0A9148F}"/>
-              </a:ext>
-            </a:extLst>
-          </p:cNvPr>
-          <p:cNvSpPr>
-            <a:spLocks noGrp="1"/>
-          </p:cNvSpPr>
-          <p:nvPr>
-            <p:ph idx="1"/>
-          </p:nvPr>
-        </p:nvSpPr>
-        <p:spPr/>
-        <p:txBody>
-          <a:bodyPr>
-            <a:normAutofit/>
-          </a:bodyPr>
-          <a:lstStyle/>
-          <a:p>
-            <a:pPr lvl="1"/>
-            <a:r>
-              <a:rPr lang="en-US" dirty="0"/>
-              <a:t>All code for this project can be found here:</a:t>
-            </a:r>
-          </a:p>
-          <a:p>
-            <a:pPr lvl="2"/>
-            <a:r>
-              <a:rPr lang="en-US" dirty="0">
-                <a:hlinkClick r:id="rId2"/>
-              </a:rPr>
-              <a:t>https://github.com/Liptoni/Springboard/tree/master/H1B_Capstone/python</a:t>
-            </a:r>
-            <a:r>
-              <a:rPr lang="en-US" dirty="0"/>
-              <a:t> </a:t>
-            </a:r>
-          </a:p>
-          <a:p>
-            <a:pPr lvl="1"/>
-            <a:endParaRPr lang="en-US" dirty="0"/>
-          </a:p>
-          <a:p>
-            <a:pPr lvl="1"/>
-            <a:endParaRPr lang="en-US" dirty="0"/>
-          </a:p>
-          <a:p>
-            <a:pPr lvl="2"/>
-            <a:endParaRPr lang="en-US" dirty="0"/>
-          </a:p>
-          <a:p>
-            <a:pPr lvl="1"/>
-            <a:endParaRPr lang="en-US" dirty="0"/>
-          </a:p>
-          <a:p>
-            <a:endParaRPr lang="en-US" dirty="0"/>
-          </a:p>
-        </p:txBody>
-      </p:sp>
-    </p:spTree>
-    <p:extLst>
-      <p:ext uri="{BB962C8B-B14F-4D97-AF65-F5344CB8AC3E}">
-        <p14:creationId xmlns:p14="http://schemas.microsoft.com/office/powerpoint/2010/main" val="3645738921"/>
-      </p:ext>
-    </p:extLst>
-  </p:cSld>
-  <p:clrMapOvr>
-    <a:masterClrMapping/>
-  </p:clrMapOvr>
-</p:sld>
-</file>
-
-<file path=ppt/slides/slide2.xml><?xml version="1.0" encoding="utf-8"?>
-<p:sld xmlns:a="http://schemas.openxmlformats.org/drawingml/2006/main" xmlns:r="http://schemas.openxmlformats.org/officeDocument/2006/relationships" xmlns:p="http://schemas.openxmlformats.org/presentationml/2006/main">
-  <p:cSld>
-    <p:spTree>
-      <p:nvGrpSpPr>
-        <p:cNvPr id="1" name=""/>
-        <p:cNvGrpSpPr/>
-        <p:nvPr/>
-      </p:nvGrpSpPr>
-      <p:grpSpPr>
-        <a:xfrm>
-          <a:off x="0" y="0"/>
-          <a:ext cx="0" cy="0"/>
-          <a:chOff x="0" y="0"/>
-          <a:chExt cx="0" cy="0"/>
-        </a:xfrm>
-      </p:grpSpPr>
-      <p:sp>
-        <p:nvSpPr>
-          <p:cNvPr id="2" name="Title 1">
-            <a:extLst>
-              <a:ext uri="{FF2B5EF4-FFF2-40B4-BE49-F238E27FC236}">
-                <a16:creationId xmlns:a16="http://schemas.microsoft.com/office/drawing/2014/main" id="{E08EC189-B582-4F74-9FE8-A516F8813C47}"/>
-              </a:ext>
-            </a:extLst>
-          </p:cNvPr>
-          <p:cNvSpPr>
-            <a:spLocks noGrp="1"/>
-          </p:cNvSpPr>
-          <p:nvPr>
-            <p:ph type="title"/>
-          </p:nvPr>
-        </p:nvSpPr>
-        <p:spPr>
-          <a:solidFill>
-            <a:schemeClr val="bg2"/>
-          </a:solidFill>
-        </p:spPr>
-        <p:txBody>
-          <a:bodyPr/>
-          <a:lstStyle/>
-          <a:p>
-            <a:r>
-              <a:rPr lang="en-US" dirty="0"/>
-              <a:t>Problem and Client</a:t>
-            </a:r>
-          </a:p>
-        </p:txBody>
-      </p:sp>
-      <p:sp>
-        <p:nvSpPr>
-          <p:cNvPr id="3" name="Content Placeholder 2">
-            <a:extLst>
-              <a:ext uri="{FF2B5EF4-FFF2-40B4-BE49-F238E27FC236}">
-                <a16:creationId xmlns:a16="http://schemas.microsoft.com/office/drawing/2014/main" id="{53B4F6B9-6E6C-4FD7-A9D0-825EE0A9148F}"/>
-              </a:ext>
-            </a:extLst>
-          </p:cNvPr>
-          <p:cNvSpPr>
-            <a:spLocks noGrp="1"/>
-          </p:cNvSpPr>
-          <p:nvPr>
-            <p:ph idx="1"/>
-          </p:nvPr>
-        </p:nvSpPr>
-        <p:spPr/>
-        <p:txBody>
-          <a:bodyPr>
-            <a:normAutofit fontScale="92500" lnSpcReduction="20000"/>
-          </a:bodyPr>
-          <a:lstStyle/>
-          <a:p>
-            <a:r>
-              <a:rPr lang="en-US" dirty="0"/>
-              <a:t>Predicting Labor Condition Application (LCA) success</a:t>
-            </a:r>
-          </a:p>
-          <a:p>
-            <a:pPr lvl="1" algn="ctr"/>
-            <a:r>
-              <a:rPr lang="en-US" dirty="0"/>
-              <a:t>Pre-requisite for final H1B visa application</a:t>
-            </a:r>
-          </a:p>
-          <a:p>
-            <a:r>
-              <a:rPr lang="en-US" dirty="0"/>
-              <a:t>Prospective Clients</a:t>
-            </a:r>
-          </a:p>
-          <a:p>
-            <a:pPr lvl="1"/>
-            <a:r>
-              <a:rPr lang="en-US" dirty="0"/>
-              <a:t>Foreign nationals hoping to secure a job</a:t>
-            </a:r>
-          </a:p>
-          <a:p>
-            <a:pPr lvl="1"/>
-            <a:r>
-              <a:rPr lang="en-US" dirty="0"/>
-              <a:t>Domestic companies hoping to sponsor a foreign born employee</a:t>
-            </a:r>
-          </a:p>
-          <a:p>
-            <a:pPr lvl="1"/>
-            <a:endParaRPr lang="en-US" dirty="0"/>
-          </a:p>
-          <a:p>
-            <a:r>
-              <a:rPr lang="en-US" dirty="0"/>
-              <a:t>Dataset</a:t>
-            </a:r>
-          </a:p>
-          <a:p>
-            <a:pPr lvl="1"/>
-            <a:r>
-              <a:rPr lang="en-US" dirty="0"/>
-              <a:t>US Department of Labor LCA petitions from 2011-2016</a:t>
-            </a:r>
-          </a:p>
-          <a:p>
-            <a:pPr lvl="2"/>
-            <a:r>
-              <a:rPr lang="en-US" dirty="0"/>
-              <a:t>N ~ 3 Million</a:t>
-            </a:r>
-          </a:p>
-          <a:p>
-            <a:pPr lvl="1"/>
-            <a:r>
-              <a:rPr lang="en-US" dirty="0"/>
-              <a:t>FCC Area API</a:t>
-            </a:r>
-          </a:p>
-          <a:p>
-            <a:pPr lvl="2"/>
-            <a:r>
-              <a:rPr lang="en-US" dirty="0"/>
-              <a:t>Census block populations</a:t>
-            </a:r>
-          </a:p>
-          <a:p>
-            <a:pPr lvl="1"/>
-            <a:r>
-              <a:rPr lang="en-US" dirty="0"/>
-              <a:t>Census Population Estimates API</a:t>
-            </a:r>
-          </a:p>
-          <a:p>
-            <a:pPr lvl="2"/>
-            <a:r>
-              <a:rPr lang="en-US" dirty="0"/>
-              <a:t>County Populations</a:t>
-            </a:r>
-          </a:p>
-        </p:txBody>
-      </p:sp>
-    </p:spTree>
-    <p:extLst>
-      <p:ext uri="{BB962C8B-B14F-4D97-AF65-F5344CB8AC3E}">
-        <p14:creationId xmlns:p14="http://schemas.microsoft.com/office/powerpoint/2010/main" val="802649709"/>
-      </p:ext>
-    </p:extLst>
-  </p:cSld>
-  <p:clrMapOvr>
-    <a:masterClrMapping/>
-  </p:clrMapOvr>
-</p:sld>
-</file>
-
-<file path=ppt/slides/slide3.xml><?xml version="1.0" encoding="utf-8"?>
-<p:sld xmlns:a="http://schemas.openxmlformats.org/drawingml/2006/main" xmlns:r="http://schemas.openxmlformats.org/officeDocument/2006/relationships" xmlns:p="http://schemas.openxmlformats.org/presentationml/2006/main">
-  <p:cSld>
-    <p:spTree>
-      <p:nvGrpSpPr>
-        <p:cNvPr id="1" name=""/>
-        <p:cNvGrpSpPr/>
-        <p:nvPr/>
-      </p:nvGrpSpPr>
-      <p:grpSpPr>
-        <a:xfrm>
-          <a:off x="0" y="0"/>
-          <a:ext cx="0" cy="0"/>
-          <a:chOff x="0" y="0"/>
-          <a:chExt cx="0" cy="0"/>
-        </a:xfrm>
-      </p:grpSpPr>
-      <p:sp>
-        <p:nvSpPr>
-          <p:cNvPr id="2" name="Title 1">
-            <a:extLst>
-              <a:ext uri="{FF2B5EF4-FFF2-40B4-BE49-F238E27FC236}">
-                <a16:creationId xmlns:a16="http://schemas.microsoft.com/office/drawing/2014/main" id="{E08EC189-B582-4F74-9FE8-A516F8813C47}"/>
-              </a:ext>
-            </a:extLst>
-          </p:cNvPr>
-          <p:cNvSpPr>
-            <a:spLocks noGrp="1"/>
-          </p:cNvSpPr>
-          <p:nvPr>
-            <p:ph type="title"/>
-          </p:nvPr>
-        </p:nvSpPr>
-        <p:spPr>
-          <a:xfrm>
-            <a:off x="838200" y="288925"/>
-            <a:ext cx="10515600" cy="1325563"/>
-          </a:xfrm>
-          <a:solidFill>
-            <a:schemeClr val="bg2"/>
-          </a:solidFill>
-        </p:spPr>
-        <p:txBody>
-          <a:bodyPr/>
-          <a:lstStyle/>
-          <a:p>
-            <a:r>
-              <a:rPr lang="en-US" dirty="0"/>
-              <a:t>Certified and Denied Applications</a:t>
-            </a:r>
-          </a:p>
-        </p:txBody>
-      </p:sp>
-      <p:sp>
-        <p:nvSpPr>
-          <p:cNvPr id="3" name="Content Placeholder 2">
-            <a:extLst>
-              <a:ext uri="{FF2B5EF4-FFF2-40B4-BE49-F238E27FC236}">
-                <a16:creationId xmlns:a16="http://schemas.microsoft.com/office/drawing/2014/main" id="{53B4F6B9-6E6C-4FD7-A9D0-825EE0A9148F}"/>
-              </a:ext>
-            </a:extLst>
-          </p:cNvPr>
-          <p:cNvSpPr>
-            <a:spLocks noGrp="1"/>
-          </p:cNvSpPr>
-          <p:nvPr>
-            <p:ph idx="1"/>
-          </p:nvPr>
-        </p:nvSpPr>
-        <p:spPr>
-          <a:xfrm>
-            <a:off x="838200" y="1825625"/>
-            <a:ext cx="2909047" cy="4351338"/>
-          </a:xfrm>
-        </p:spPr>
-        <p:txBody>
-          <a:bodyPr/>
-          <a:lstStyle/>
-          <a:p>
-            <a:r>
-              <a:rPr lang="en-US" dirty="0"/>
-              <a:t>Certified Applications</a:t>
-            </a:r>
-          </a:p>
-          <a:p>
-            <a:pPr lvl="1"/>
-            <a:r>
-              <a:rPr lang="en-US" dirty="0"/>
-              <a:t>n = 2,818,282</a:t>
-            </a:r>
-          </a:p>
-          <a:p>
-            <a:r>
-              <a:rPr lang="en-US" dirty="0"/>
-              <a:t>Denied Applications</a:t>
-            </a:r>
-          </a:p>
-          <a:p>
-            <a:pPr lvl="1"/>
-            <a:r>
-              <a:rPr lang="en-US" dirty="0"/>
-              <a:t>n = 94,346</a:t>
-            </a:r>
-          </a:p>
-          <a:p>
-            <a:r>
-              <a:rPr lang="en-US" dirty="0"/>
-              <a:t>Percent certified increased ever year</a:t>
-            </a:r>
-          </a:p>
-          <a:p>
-            <a:pPr marL="0" indent="0">
-              <a:buNone/>
-            </a:pPr>
-            <a:endParaRPr lang="en-US" dirty="0"/>
-          </a:p>
-        </p:txBody>
-      </p:sp>
-      <p:pic>
-        <p:nvPicPr>
-          <p:cNvPr id="5" name="Picture 4">
-            <a:extLst>
-              <a:ext uri="{FF2B5EF4-FFF2-40B4-BE49-F238E27FC236}">
-                <a16:creationId xmlns:a16="http://schemas.microsoft.com/office/drawing/2014/main" id="{8DDCAF83-4D73-47F9-AFE5-0BCEBADD56C3}"/>
-              </a:ext>
-            </a:extLst>
-          </p:cNvPr>
-          <p:cNvPicPr>
-            <a:picLocks noChangeAspect="1"/>
-          </p:cNvPicPr>
-          <p:nvPr/>
-        </p:nvPicPr>
-        <p:blipFill>
-          <a:blip r:embed="rId2">
-            <a:extLst>
-              <a:ext uri="{28A0092B-C50C-407E-A947-70E740481C1C}">
-                <a14:useLocalDpi xmlns:a14="http://schemas.microsoft.com/office/drawing/2010/main" val="0"/>
-              </a:ext>
-            </a:extLst>
-          </a:blip>
-          <a:stretch>
-            <a:fillRect/>
-          </a:stretch>
-        </p:blipFill>
-        <p:spPr>
-          <a:xfrm>
-            <a:off x="5031450" y="2213638"/>
-            <a:ext cx="5760731" cy="3575311"/>
-          </a:xfrm>
-          <a:prstGeom prst="rect">
-            <a:avLst/>
-          </a:prstGeom>
-        </p:spPr>
-      </p:pic>
-    </p:spTree>
-    <p:extLst>
-      <p:ext uri="{BB962C8B-B14F-4D97-AF65-F5344CB8AC3E}">
-        <p14:creationId xmlns:p14="http://schemas.microsoft.com/office/powerpoint/2010/main" val="2934126734"/>
-      </p:ext>
-    </p:extLst>
-  </p:cSld>
-  <p:clrMapOvr>
-    <a:masterClrMapping/>
-  </p:clrMapOvr>
-</p:sld>
-</file>
-
-<file path=ppt/slides/slide4.xml><?xml version="1.0" encoding="utf-8"?>
-<p:sld xmlns:a="http://schemas.openxmlformats.org/drawingml/2006/main" xmlns:r="http://schemas.openxmlformats.org/officeDocument/2006/relationships" xmlns:p="http://schemas.openxmlformats.org/presentationml/2006/main">
-  <p:cSld>
-    <p:spTree>
-      <p:nvGrpSpPr>
-        <p:cNvPr id="1" name=""/>
-        <p:cNvGrpSpPr/>
-        <p:nvPr/>
-      </p:nvGrpSpPr>
-      <p:grpSpPr>
-        <a:xfrm>
-          <a:off x="0" y="0"/>
-          <a:ext cx="0" cy="0"/>
-          <a:chOff x="0" y="0"/>
-          <a:chExt cx="0" cy="0"/>
-        </a:xfrm>
-      </p:grpSpPr>
-      <p:sp>
-        <p:nvSpPr>
-          <p:cNvPr id="2" name="Title 1">
-            <a:extLst>
-              <a:ext uri="{FF2B5EF4-FFF2-40B4-BE49-F238E27FC236}">
-                <a16:creationId xmlns:a16="http://schemas.microsoft.com/office/drawing/2014/main" id="{E08EC189-B582-4F74-9FE8-A516F8813C47}"/>
-              </a:ext>
-            </a:extLst>
-          </p:cNvPr>
-          <p:cNvSpPr>
-            <a:spLocks noGrp="1"/>
-          </p:cNvSpPr>
-          <p:nvPr>
-            <p:ph type="title"/>
-          </p:nvPr>
-        </p:nvSpPr>
-        <p:spPr>
-          <a:xfrm>
-            <a:off x="838200" y="288925"/>
-            <a:ext cx="10515600" cy="1325563"/>
-          </a:xfrm>
-          <a:solidFill>
-            <a:schemeClr val="bg2"/>
-          </a:solidFill>
-        </p:spPr>
-        <p:txBody>
-          <a:bodyPr/>
-          <a:lstStyle/>
-          <a:p>
-            <a:r>
-              <a:rPr lang="en-US" dirty="0"/>
-              <a:t>Certified and Denied Applications</a:t>
-            </a:r>
-          </a:p>
-        </p:txBody>
-      </p:sp>
-      <p:sp>
-        <p:nvSpPr>
-          <p:cNvPr id="3" name="Content Placeholder 2">
-            <a:extLst>
-              <a:ext uri="{FF2B5EF4-FFF2-40B4-BE49-F238E27FC236}">
-                <a16:creationId xmlns:a16="http://schemas.microsoft.com/office/drawing/2014/main" id="{53B4F6B9-6E6C-4FD7-A9D0-825EE0A9148F}"/>
-              </a:ext>
-            </a:extLst>
-          </p:cNvPr>
-          <p:cNvSpPr>
-            <a:spLocks noGrp="1"/>
-          </p:cNvSpPr>
-          <p:nvPr>
-            <p:ph idx="1"/>
-          </p:nvPr>
-        </p:nvSpPr>
-        <p:spPr>
-          <a:xfrm>
-            <a:off x="983490" y="2804365"/>
-            <a:ext cx="3814482" cy="1249269"/>
-          </a:xfrm>
-        </p:spPr>
-        <p:txBody>
-          <a:bodyPr/>
-          <a:lstStyle/>
-          <a:p>
-            <a:r>
-              <a:rPr lang="en-US" sz="2400" dirty="0"/>
-              <a:t>Prevailing Wage (non-zero)</a:t>
-            </a:r>
-          </a:p>
-          <a:p>
-            <a:pPr lvl="1"/>
-            <a:r>
-              <a:rPr lang="en-US" dirty="0"/>
-              <a:t>mean = $141,144</a:t>
-            </a:r>
-          </a:p>
-          <a:p>
-            <a:pPr lvl="1"/>
-            <a:r>
-              <a:rPr lang="en-US" dirty="0"/>
-              <a:t>median = $65,000</a:t>
-            </a:r>
-          </a:p>
-          <a:p>
-            <a:pPr marL="0" indent="0">
-              <a:buNone/>
-            </a:pPr>
-            <a:endParaRPr lang="en-US" dirty="0"/>
-          </a:p>
-        </p:txBody>
-      </p:sp>
-      <p:pic>
-        <p:nvPicPr>
-          <p:cNvPr id="5" name="Picture 4">
-            <a:extLst>
-              <a:ext uri="{FF2B5EF4-FFF2-40B4-BE49-F238E27FC236}">
-                <a16:creationId xmlns:a16="http://schemas.microsoft.com/office/drawing/2014/main" id="{8DDCAF83-4D73-47F9-AFE5-0BCEBADD56C3}"/>
-              </a:ext>
-            </a:extLst>
-          </p:cNvPr>
-          <p:cNvPicPr>
-            <a:picLocks noChangeAspect="1"/>
-          </p:cNvPicPr>
-          <p:nvPr/>
-        </p:nvPicPr>
-        <p:blipFill>
-          <a:blip r:embed="rId2">
-            <a:extLst>
-              <a:ext uri="{28A0092B-C50C-407E-A947-70E740481C1C}">
-                <a14:useLocalDpi xmlns:a14="http://schemas.microsoft.com/office/drawing/2010/main" val="0"/>
-              </a:ext>
-            </a:extLst>
-          </a:blip>
-          <a:stretch>
-            <a:fillRect/>
-          </a:stretch>
-        </p:blipFill>
-        <p:spPr>
-          <a:xfrm>
-            <a:off x="5580158" y="1827970"/>
-            <a:ext cx="5701924" cy="4113380"/>
-          </a:xfrm>
-          <a:prstGeom prst="rect">
-            <a:avLst/>
-          </a:prstGeom>
-        </p:spPr>
-      </p:pic>
-    </p:spTree>
-    <p:extLst>
-      <p:ext uri="{BB962C8B-B14F-4D97-AF65-F5344CB8AC3E}">
-        <p14:creationId xmlns:p14="http://schemas.microsoft.com/office/powerpoint/2010/main" val="3859874370"/>
-      </p:ext>
-    </p:extLst>
-  </p:cSld>
-  <p:clrMapOvr>
-    <a:masterClrMapping/>
-  </p:clrMapOvr>
-</p:sld>
-</file>
-
-<file path=ppt/slides/slide5.xml><?xml version="1.0" encoding="utf-8"?>
-<p:sld xmlns:a="http://schemas.openxmlformats.org/drawingml/2006/main" xmlns:r="http://schemas.openxmlformats.org/officeDocument/2006/relationships" xmlns:p="http://schemas.openxmlformats.org/presentationml/2006/main">
-  <p:cSld>
-    <p:spTree>
-      <p:nvGrpSpPr>
-        <p:cNvPr id="1" name=""/>
-        <p:cNvGrpSpPr/>
-        <p:nvPr/>
-      </p:nvGrpSpPr>
-      <p:grpSpPr>
-        <a:xfrm>
-          <a:off x="0" y="0"/>
-          <a:ext cx="0" cy="0"/>
-          <a:chOff x="0" y="0"/>
-          <a:chExt cx="0" cy="0"/>
-        </a:xfrm>
-      </p:grpSpPr>
-      <p:sp>
-        <p:nvSpPr>
-          <p:cNvPr id="2" name="Title 1">
-            <a:extLst>
-              <a:ext uri="{FF2B5EF4-FFF2-40B4-BE49-F238E27FC236}">
-                <a16:creationId xmlns:a16="http://schemas.microsoft.com/office/drawing/2014/main" id="{E08EC189-B582-4F74-9FE8-A516F8813C47}"/>
-              </a:ext>
-            </a:extLst>
-          </p:cNvPr>
-          <p:cNvSpPr>
-            <a:spLocks noGrp="1"/>
-          </p:cNvSpPr>
-          <p:nvPr>
-            <p:ph type="title"/>
-          </p:nvPr>
-        </p:nvSpPr>
-        <p:spPr>
-          <a:xfrm>
-            <a:off x="838200" y="288925"/>
-            <a:ext cx="10515600" cy="1325563"/>
-          </a:xfrm>
-          <a:solidFill>
-            <a:schemeClr val="bg2"/>
-          </a:solidFill>
-        </p:spPr>
-        <p:txBody>
-          <a:bodyPr/>
-          <a:lstStyle/>
-          <a:p>
-            <a:r>
-              <a:rPr lang="en-US" dirty="0"/>
-              <a:t>Part-time and Full-time Positions</a:t>
-            </a:r>
-          </a:p>
-        </p:txBody>
-      </p:sp>
-      <p:sp>
-        <p:nvSpPr>
-          <p:cNvPr id="3" name="Content Placeholder 2">
-            <a:extLst>
-              <a:ext uri="{FF2B5EF4-FFF2-40B4-BE49-F238E27FC236}">
-                <a16:creationId xmlns:a16="http://schemas.microsoft.com/office/drawing/2014/main" id="{53B4F6B9-6E6C-4FD7-A9D0-825EE0A9148F}"/>
-              </a:ext>
-            </a:extLst>
-          </p:cNvPr>
-          <p:cNvSpPr>
-            <a:spLocks noGrp="1"/>
-          </p:cNvSpPr>
-          <p:nvPr>
-            <p:ph idx="1"/>
-          </p:nvPr>
-        </p:nvSpPr>
-        <p:spPr>
-          <a:xfrm>
-            <a:off x="983490" y="2804365"/>
-            <a:ext cx="3814482" cy="1249269"/>
-          </a:xfrm>
-        </p:spPr>
-        <p:txBody>
-          <a:bodyPr/>
-          <a:lstStyle/>
-          <a:p>
-            <a:r>
-              <a:rPr lang="en-US" sz="2400" dirty="0"/>
-              <a:t>Full-time applications far outnumber part-time…</a:t>
-            </a:r>
-          </a:p>
-          <a:p>
-            <a:r>
-              <a:rPr lang="en-US" sz="2400" dirty="0"/>
-              <a:t>…Until 2016</a:t>
-            </a:r>
-          </a:p>
-          <a:p>
-            <a:endParaRPr lang="en-US" dirty="0"/>
-          </a:p>
-          <a:p>
-            <a:pPr marL="0" indent="0">
-              <a:buNone/>
-            </a:pPr>
-            <a:endParaRPr lang="en-US" dirty="0"/>
-          </a:p>
-        </p:txBody>
-      </p:sp>
-      <p:pic>
-        <p:nvPicPr>
-          <p:cNvPr id="5" name="Picture 4">
-            <a:extLst>
-              <a:ext uri="{FF2B5EF4-FFF2-40B4-BE49-F238E27FC236}">
-                <a16:creationId xmlns:a16="http://schemas.microsoft.com/office/drawing/2014/main" id="{8DDCAF83-4D73-47F9-AFE5-0BCEBADD56C3}"/>
-              </a:ext>
-            </a:extLst>
-          </p:cNvPr>
-          <p:cNvPicPr>
-            <a:picLocks noChangeAspect="1"/>
-          </p:cNvPicPr>
-          <p:nvPr/>
-        </p:nvPicPr>
-        <p:blipFill>
-          <a:blip r:embed="rId2">
-            <a:extLst>
-              <a:ext uri="{28A0092B-C50C-407E-A947-70E740481C1C}">
-                <a14:useLocalDpi xmlns:a14="http://schemas.microsoft.com/office/drawing/2010/main" val="0"/>
-              </a:ext>
-            </a:extLst>
-          </a:blip>
-          <a:stretch>
-            <a:fillRect/>
-          </a:stretch>
-        </p:blipFill>
-        <p:spPr>
-          <a:xfrm>
-            <a:off x="5109882" y="1827970"/>
-            <a:ext cx="5973530" cy="4113380"/>
-          </a:xfrm>
-          <a:prstGeom prst="rect">
-            <a:avLst/>
-          </a:prstGeom>
-        </p:spPr>
-      </p:pic>
-    </p:spTree>
-    <p:extLst>
-      <p:ext uri="{BB962C8B-B14F-4D97-AF65-F5344CB8AC3E}">
-        <p14:creationId xmlns:p14="http://schemas.microsoft.com/office/powerpoint/2010/main" val="2469504354"/>
-      </p:ext>
-    </p:extLst>
-  </p:cSld>
-  <p:clrMapOvr>
-    <a:masterClrMapping/>
-  </p:clrMapOvr>
-</p:sld>
-</file>
-
-<file path=ppt/slides/slide6.xml><?xml version="1.0" encoding="utf-8"?>
-<p:sld xmlns:a="http://schemas.openxmlformats.org/drawingml/2006/main" xmlns:r="http://schemas.openxmlformats.org/officeDocument/2006/relationships" xmlns:p="http://schemas.openxmlformats.org/presentationml/2006/main">
-  <p:cSld>
-    <p:spTree>
-      <p:nvGrpSpPr>
-        <p:cNvPr id="1" name=""/>
-        <p:cNvGrpSpPr/>
-        <p:nvPr/>
-      </p:nvGrpSpPr>
-      <p:grpSpPr>
-        <a:xfrm>
-          <a:off x="0" y="0"/>
-          <a:ext cx="0" cy="0"/>
-          <a:chOff x="0" y="0"/>
-          <a:chExt cx="0" cy="0"/>
-        </a:xfrm>
-      </p:grpSpPr>
-      <p:sp>
-        <p:nvSpPr>
-          <p:cNvPr id="2" name="Title 1">
-            <a:extLst>
-              <a:ext uri="{FF2B5EF4-FFF2-40B4-BE49-F238E27FC236}">
-                <a16:creationId xmlns:a16="http://schemas.microsoft.com/office/drawing/2014/main" id="{E08EC189-B582-4F74-9FE8-A516F8813C47}"/>
-              </a:ext>
-            </a:extLst>
-          </p:cNvPr>
-          <p:cNvSpPr>
-            <a:spLocks noGrp="1"/>
-          </p:cNvSpPr>
-          <p:nvPr>
-            <p:ph type="title"/>
-          </p:nvPr>
-        </p:nvSpPr>
-        <p:spPr>
-          <a:solidFill>
-            <a:schemeClr val="bg2"/>
-          </a:solidFill>
-        </p:spPr>
-        <p:txBody>
-          <a:bodyPr/>
-          <a:lstStyle/>
-          <a:p>
-            <a:r>
-              <a:rPr lang="en-US" dirty="0"/>
-              <a:t>Preliminary Statistical Analysis</a:t>
-            </a:r>
-          </a:p>
-        </p:txBody>
-      </p:sp>
-      <p:sp>
-        <p:nvSpPr>
-          <p:cNvPr id="3" name="Content Placeholder 2">
-            <a:extLst>
-              <a:ext uri="{FF2B5EF4-FFF2-40B4-BE49-F238E27FC236}">
-                <a16:creationId xmlns:a16="http://schemas.microsoft.com/office/drawing/2014/main" id="{53B4F6B9-6E6C-4FD7-A9D0-825EE0A9148F}"/>
-              </a:ext>
-            </a:extLst>
-          </p:cNvPr>
-          <p:cNvSpPr>
-            <a:spLocks noGrp="1"/>
-          </p:cNvSpPr>
-          <p:nvPr>
-            <p:ph idx="1"/>
-          </p:nvPr>
-        </p:nvSpPr>
-        <p:spPr/>
-        <p:txBody>
-          <a:bodyPr>
-            <a:normAutofit lnSpcReduction="10000"/>
-          </a:bodyPr>
-          <a:lstStyle/>
-          <a:p>
-            <a:r>
-              <a:rPr lang="en-US" dirty="0"/>
-              <a:t>Mean wage between certified and denied not equal</a:t>
-            </a:r>
-          </a:p>
-          <a:p>
-            <a:pPr lvl="1"/>
-            <a:r>
-              <a:rPr lang="en-US" dirty="0"/>
-              <a:t>p ≈ 0</a:t>
-            </a:r>
-          </a:p>
-          <a:p>
-            <a:pPr lvl="1"/>
-            <a:endParaRPr lang="en-US" dirty="0"/>
-          </a:p>
-          <a:p>
-            <a:r>
-              <a:rPr lang="en-US" dirty="0"/>
-              <a:t>Mean wage between full-time and part-time positions not equal</a:t>
-            </a:r>
-          </a:p>
-          <a:p>
-            <a:pPr lvl="1"/>
-            <a:r>
-              <a:rPr lang="en-US" dirty="0"/>
-              <a:t>p ≈ 0</a:t>
-            </a:r>
-          </a:p>
-          <a:p>
-            <a:pPr lvl="1"/>
-            <a:endParaRPr lang="en-US" dirty="0"/>
-          </a:p>
-          <a:p>
-            <a:r>
-              <a:rPr lang="en-US" dirty="0"/>
-              <a:t>Mean county population for certified and denied not equal</a:t>
-            </a:r>
-          </a:p>
-          <a:p>
-            <a:pPr lvl="1"/>
-            <a:r>
-              <a:rPr lang="en-US" dirty="0"/>
-              <a:t>p ≈ 0</a:t>
-            </a:r>
-          </a:p>
-          <a:p>
-            <a:pPr lvl="1"/>
-            <a:endParaRPr lang="en-US" dirty="0"/>
-          </a:p>
-          <a:p>
-            <a:r>
-              <a:rPr lang="en-US" dirty="0"/>
-              <a:t>All of these possibly skewed by very large dataset</a:t>
-            </a:r>
-          </a:p>
-          <a:p>
-            <a:pPr lvl="1"/>
-            <a:endParaRPr lang="en-US" dirty="0"/>
-          </a:p>
-          <a:p>
-            <a:pPr lvl="1"/>
-            <a:endParaRPr lang="en-US" dirty="0"/>
-          </a:p>
-          <a:p>
-            <a:endParaRPr lang="en-US" dirty="0"/>
-          </a:p>
-        </p:txBody>
-      </p:sp>
-    </p:spTree>
-    <p:extLst>
-      <p:ext uri="{BB962C8B-B14F-4D97-AF65-F5344CB8AC3E}">
-        <p14:creationId xmlns:p14="http://schemas.microsoft.com/office/powerpoint/2010/main" val="3219171758"/>
-      </p:ext>
-    </p:extLst>
-  </p:cSld>
-  <p:clrMapOvr>
-    <a:masterClrMapping/>
-  </p:clrMapOvr>
-</p:sld>
-</file>
-
-<file path=ppt/slides/slide7.xml><?xml version="1.0" encoding="utf-8"?>
-<p:sld xmlns:a="http://schemas.openxmlformats.org/drawingml/2006/main" xmlns:r="http://schemas.openxmlformats.org/officeDocument/2006/relationships" xmlns:p="http://schemas.openxmlformats.org/presentationml/2006/main">
-  <p:cSld>
-    <p:spTree>
-      <p:nvGrpSpPr>
-        <p:cNvPr id="1" name=""/>
-        <p:cNvGrpSpPr/>
-        <p:nvPr/>
-      </p:nvGrpSpPr>
-      <p:grpSpPr>
-        <a:xfrm>
-          <a:off x="0" y="0"/>
-          <a:ext cx="0" cy="0"/>
-          <a:chOff x="0" y="0"/>
-          <a:chExt cx="0" cy="0"/>
-        </a:xfrm>
-      </p:grpSpPr>
-      <p:sp>
-        <p:nvSpPr>
-          <p:cNvPr id="2" name="Title 1">
-            <a:extLst>
-              <a:ext uri="{FF2B5EF4-FFF2-40B4-BE49-F238E27FC236}">
-                <a16:creationId xmlns:a16="http://schemas.microsoft.com/office/drawing/2014/main" id="{E08EC189-B582-4F74-9FE8-A516F8813C47}"/>
-              </a:ext>
-            </a:extLst>
-          </p:cNvPr>
-          <p:cNvSpPr>
-            <a:spLocks noGrp="1"/>
-          </p:cNvSpPr>
-          <p:nvPr>
-            <p:ph type="title"/>
-          </p:nvPr>
-        </p:nvSpPr>
-        <p:spPr>
-          <a:xfrm>
-            <a:off x="838200" y="288925"/>
-            <a:ext cx="10515600" cy="1325563"/>
-          </a:xfrm>
-          <a:solidFill>
-            <a:schemeClr val="bg2"/>
-          </a:solidFill>
-        </p:spPr>
-        <p:txBody>
-          <a:bodyPr/>
-          <a:lstStyle/>
-          <a:p>
-            <a:r>
-              <a:rPr lang="en-US" dirty="0"/>
-              <a:t>County Population vs. Wage Correlation</a:t>
-            </a:r>
-          </a:p>
-        </p:txBody>
-      </p:sp>
-      <p:sp>
-        <p:nvSpPr>
-          <p:cNvPr id="3" name="Content Placeholder 2">
-            <a:extLst>
-              <a:ext uri="{FF2B5EF4-FFF2-40B4-BE49-F238E27FC236}">
-                <a16:creationId xmlns:a16="http://schemas.microsoft.com/office/drawing/2014/main" id="{53B4F6B9-6E6C-4FD7-A9D0-825EE0A9148F}"/>
-              </a:ext>
-            </a:extLst>
-          </p:cNvPr>
-          <p:cNvSpPr>
-            <a:spLocks noGrp="1"/>
-          </p:cNvSpPr>
-          <p:nvPr>
-            <p:ph idx="1"/>
-          </p:nvPr>
-        </p:nvSpPr>
-        <p:spPr>
-          <a:xfrm>
-            <a:off x="983490" y="2804365"/>
-            <a:ext cx="3814482" cy="1249269"/>
-          </a:xfrm>
-        </p:spPr>
-        <p:txBody>
-          <a:bodyPr/>
-          <a:lstStyle/>
-          <a:p>
-            <a:r>
-              <a:rPr lang="en-US" sz="2400" dirty="0"/>
-              <a:t>Essentially no correlation between county population and wage</a:t>
-            </a:r>
-          </a:p>
-          <a:p>
-            <a:endParaRPr lang="en-US" dirty="0"/>
-          </a:p>
-          <a:p>
-            <a:pPr marL="0" indent="0">
-              <a:buNone/>
-            </a:pPr>
-            <a:endParaRPr lang="en-US" dirty="0"/>
-          </a:p>
-        </p:txBody>
-      </p:sp>
-      <p:pic>
-        <p:nvPicPr>
-          <p:cNvPr id="5" name="Picture 4">
-            <a:extLst>
-              <a:ext uri="{FF2B5EF4-FFF2-40B4-BE49-F238E27FC236}">
-                <a16:creationId xmlns:a16="http://schemas.microsoft.com/office/drawing/2014/main" id="{8DDCAF83-4D73-47F9-AFE5-0BCEBADD56C3}"/>
-              </a:ext>
-            </a:extLst>
-          </p:cNvPr>
-          <p:cNvPicPr>
-            <a:picLocks noChangeAspect="1"/>
-          </p:cNvPicPr>
-          <p:nvPr/>
-        </p:nvPicPr>
-        <p:blipFill>
-          <a:blip r:embed="rId2">
-            <a:extLst>
-              <a:ext uri="{28A0092B-C50C-407E-A947-70E740481C1C}">
-                <a14:useLocalDpi xmlns:a14="http://schemas.microsoft.com/office/drawing/2010/main" val="0"/>
-              </a:ext>
-            </a:extLst>
-          </a:blip>
-          <a:stretch>
-            <a:fillRect/>
-          </a:stretch>
-        </p:blipFill>
-        <p:spPr>
-          <a:xfrm>
-            <a:off x="5508759" y="1827970"/>
-            <a:ext cx="5175776" cy="4113380"/>
-          </a:xfrm>
-          <a:prstGeom prst="rect">
-            <a:avLst/>
-          </a:prstGeom>
-        </p:spPr>
-      </p:pic>
-    </p:spTree>
-    <p:extLst>
-      <p:ext uri="{BB962C8B-B14F-4D97-AF65-F5344CB8AC3E}">
-        <p14:creationId xmlns:p14="http://schemas.microsoft.com/office/powerpoint/2010/main" val="3154086852"/>
-      </p:ext>
-    </p:extLst>
-  </p:cSld>
-  <p:clrMapOvr>
-    <a:masterClrMapping/>
-  </p:clrMapOvr>
-</p:sld>
-</file>
-
-<file path=ppt/slides/slide8.xml><?xml version="1.0" encoding="utf-8"?>
-<p:sld xmlns:a="http://schemas.openxmlformats.org/drawingml/2006/main" xmlns:r="http://schemas.openxmlformats.org/officeDocument/2006/relationships" xmlns:p="http://schemas.openxmlformats.org/presentationml/2006/main">
-  <p:cSld>
-    <p:spTree>
-      <p:nvGrpSpPr>
-        <p:cNvPr id="1" name=""/>
-        <p:cNvGrpSpPr/>
-        <p:nvPr/>
-      </p:nvGrpSpPr>
-      <p:grpSpPr>
-        <a:xfrm>
-          <a:off x="0" y="0"/>
-          <a:ext cx="0" cy="0"/>
-          <a:chOff x="0" y="0"/>
-          <a:chExt cx="0" cy="0"/>
-        </a:xfrm>
-      </p:grpSpPr>
-      <p:sp>
-        <p:nvSpPr>
-          <p:cNvPr id="2" name="Title 1">
-            <a:extLst>
-              <a:ext uri="{FF2B5EF4-FFF2-40B4-BE49-F238E27FC236}">
-                <a16:creationId xmlns:a16="http://schemas.microsoft.com/office/drawing/2014/main" id="{E08EC189-B582-4F74-9FE8-A516F8813C47}"/>
-              </a:ext>
-            </a:extLst>
-          </p:cNvPr>
-          <p:cNvSpPr>
-            <a:spLocks noGrp="1"/>
-          </p:cNvSpPr>
-          <p:nvPr>
-            <p:ph type="title"/>
-          </p:nvPr>
-        </p:nvSpPr>
-        <p:spPr>
-          <a:solidFill>
-            <a:schemeClr val="bg2"/>
-          </a:solidFill>
-        </p:spPr>
-        <p:txBody>
-          <a:bodyPr/>
-          <a:lstStyle/>
-          <a:p>
-            <a:r>
-              <a:rPr lang="en-US" dirty="0"/>
-              <a:t>Classification Analysis</a:t>
-            </a:r>
-          </a:p>
-        </p:txBody>
-      </p:sp>
-      <p:sp>
-        <p:nvSpPr>
-          <p:cNvPr id="3" name="Content Placeholder 2">
-            <a:extLst>
-              <a:ext uri="{FF2B5EF4-FFF2-40B4-BE49-F238E27FC236}">
-                <a16:creationId xmlns:a16="http://schemas.microsoft.com/office/drawing/2014/main" id="{53B4F6B9-6E6C-4FD7-A9D0-825EE0A9148F}"/>
-              </a:ext>
-            </a:extLst>
-          </p:cNvPr>
-          <p:cNvSpPr>
-            <a:spLocks noGrp="1"/>
-          </p:cNvSpPr>
-          <p:nvPr>
-            <p:ph idx="1"/>
-          </p:nvPr>
-        </p:nvSpPr>
-        <p:spPr/>
-        <p:txBody>
-          <a:bodyPr>
-            <a:normAutofit/>
-          </a:bodyPr>
-          <a:lstStyle/>
-          <a:p>
-            <a:pPr lvl="1"/>
-            <a:r>
-              <a:rPr lang="en-US" dirty="0"/>
-              <a:t>SGD Classifier</a:t>
-            </a:r>
-          </a:p>
-          <a:p>
-            <a:pPr lvl="2"/>
-            <a:r>
-              <a:rPr lang="en-US" dirty="0"/>
-              <a:t>Hyperparameters: alpha, loss, penalty, </a:t>
-            </a:r>
-            <a:r>
-              <a:rPr lang="en-US" dirty="0" err="1"/>
-              <a:t>max_iter</a:t>
-            </a:r>
-            <a:endParaRPr lang="en-US" dirty="0"/>
-          </a:p>
-          <a:p>
-            <a:pPr lvl="1"/>
-            <a:r>
-              <a:rPr lang="en-US" dirty="0"/>
-              <a:t>Features</a:t>
-            </a:r>
-          </a:p>
-          <a:p>
-            <a:pPr lvl="2"/>
-            <a:r>
-              <a:rPr lang="en-US" sz="1800" dirty="0"/>
-              <a:t>FULL_TIME_POSITION, PREVAILING_WAGE, SOC_NAME, </a:t>
-            </a:r>
-            <a:r>
-              <a:rPr lang="en-US" sz="1800" dirty="0" err="1"/>
-              <a:t>lon</a:t>
-            </a:r>
-            <a:r>
-              <a:rPr lang="en-US" sz="1800" dirty="0"/>
-              <a:t>, </a:t>
-            </a:r>
-            <a:r>
-              <a:rPr lang="en-US" sz="1800" dirty="0" err="1"/>
-              <a:t>lat</a:t>
-            </a:r>
-            <a:r>
-              <a:rPr lang="en-US" sz="1800" dirty="0"/>
-              <a:t>, </a:t>
-            </a:r>
-            <a:r>
-              <a:rPr lang="en-US" sz="1800" dirty="0" err="1"/>
-              <a:t>block_fis</a:t>
-            </a:r>
-            <a:r>
-              <a:rPr lang="en-US" sz="1800" dirty="0"/>
-              <a:t>, block_pop_2015, </a:t>
-            </a:r>
-            <a:r>
-              <a:rPr lang="en-US" sz="1800" dirty="0" err="1"/>
-              <a:t>county_fips</a:t>
-            </a:r>
-            <a:r>
-              <a:rPr lang="en-US" sz="1800" dirty="0"/>
-              <a:t>, </a:t>
-            </a:r>
-            <a:r>
-              <a:rPr lang="en-US" sz="1800" dirty="0" err="1"/>
-              <a:t>county_pop</a:t>
-            </a:r>
-            <a:r>
-              <a:rPr lang="en-US" sz="1800" dirty="0"/>
-              <a:t>, </a:t>
-            </a:r>
-            <a:r>
-              <a:rPr lang="en-US" sz="1800" dirty="0" err="1"/>
-              <a:t>state_code</a:t>
-            </a:r>
-            <a:endParaRPr lang="en-US" sz="1800" dirty="0"/>
-          </a:p>
-          <a:p>
-            <a:pPr lvl="2"/>
-            <a:r>
-              <a:rPr lang="en-US" dirty="0"/>
-              <a:t>Reduced the number of features as I proceeded through cross-validation</a:t>
-            </a:r>
-          </a:p>
-          <a:p>
-            <a:pPr lvl="1"/>
-            <a:r>
-              <a:rPr lang="en-US" dirty="0"/>
-              <a:t>Cross-validation</a:t>
-            </a:r>
-          </a:p>
-          <a:p>
-            <a:pPr lvl="2"/>
-            <a:r>
-              <a:rPr lang="en-US" dirty="0"/>
-              <a:t>Five-fold</a:t>
-            </a:r>
-          </a:p>
-          <a:p>
-            <a:pPr lvl="1"/>
-            <a:r>
-              <a:rPr lang="en-US" dirty="0"/>
-              <a:t>Other Parameters</a:t>
-            </a:r>
-          </a:p>
-          <a:p>
-            <a:pPr lvl="2"/>
-            <a:r>
-              <a:rPr lang="en-US" dirty="0"/>
-              <a:t>Kernel Approximation</a:t>
-            </a:r>
-          </a:p>
-          <a:p>
-            <a:pPr lvl="2"/>
-            <a:r>
-              <a:rPr lang="en-US" dirty="0"/>
-              <a:t>Imputation</a:t>
-            </a:r>
-          </a:p>
-          <a:p>
-            <a:pPr lvl="2"/>
-            <a:r>
-              <a:rPr lang="en-US" dirty="0"/>
-              <a:t>Intercept Fit</a:t>
-            </a:r>
-          </a:p>
-          <a:p>
-            <a:pPr lvl="2"/>
-            <a:endParaRPr lang="en-US" dirty="0"/>
-          </a:p>
-          <a:p>
-            <a:pPr lvl="1"/>
-            <a:endParaRPr lang="en-US" dirty="0"/>
-          </a:p>
-          <a:p>
-            <a:endParaRPr lang="en-US" dirty="0"/>
-          </a:p>
-        </p:txBody>
-      </p:sp>
-    </p:spTree>
-    <p:extLst>
-      <p:ext uri="{BB962C8B-B14F-4D97-AF65-F5344CB8AC3E}">
-        <p14:creationId xmlns:p14="http://schemas.microsoft.com/office/powerpoint/2010/main" val="677513240"/>
-      </p:ext>
-    </p:extLst>
-  </p:cSld>
-  <p:clrMapOvr>
-    <a:masterClrMapping/>
-  </p:clrMapOvr>
-</p:sld>
-</file>
-
-<file path=ppt/slides/slide9.xml><?xml version="1.0" encoding="utf-8"?>
 <p:sld xmlns:a="http://schemas.openxmlformats.org/drawingml/2006/main" xmlns:r="http://schemas.openxmlformats.org/officeDocument/2006/relationships" xmlns:p="http://schemas.openxmlformats.org/presentationml/2006/main">
   <p:cSld>
     <p:spTree>
@@ -5383,12 +4656,12 @@
                         </a:spcAft>
                       </a:pPr>
                       <a:r>
-                        <a:rPr lang="en-US" sz="1100">
+                        <a:rPr lang="en-US" sz="1100" dirty="0">
                           <a:effectLst/>
                         </a:rPr>
                         <a:t>Precision (certified; denied; weighted)</a:t>
                       </a:r>
-                      <a:endParaRPr lang="en-US" sz="1100">
+                      <a:endParaRPr lang="en-US" sz="1100" dirty="0">
                         <a:effectLst/>
                         <a:latin typeface="Calibri" panose="020F0502020204030204" pitchFamily="34" charset="0"/>
                         <a:ea typeface="Calibri" panose="020F0502020204030204" pitchFamily="34" charset="0"/>
@@ -7080,12 +6353,12 @@
                         </a:spcAft>
                       </a:pPr>
                       <a:r>
-                        <a:rPr lang="en-US" sz="1100">
+                        <a:rPr lang="en-US" sz="1100" dirty="0">
                           <a:effectLst/>
                         </a:rPr>
                         <a:t>FALSE</a:t>
                       </a:r>
-                      <a:endParaRPr lang="en-US" sz="1100">
+                      <a:endParaRPr lang="en-US" sz="1100" dirty="0">
                         <a:effectLst/>
                         <a:latin typeface="Calibri" panose="020F0502020204030204" pitchFamily="34" charset="0"/>
                         <a:ea typeface="Calibri" panose="020F0502020204030204" pitchFamily="34" charset="0"/>
@@ -7112,12 +6385,12 @@
                         </a:spcAft>
                       </a:pPr>
                       <a:r>
-                        <a:rPr lang="en-US" sz="1100">
+                        <a:rPr lang="en-US" sz="1100" dirty="0">
                           <a:effectLst/>
                         </a:rPr>
                         <a:t>0.63599</a:t>
                       </a:r>
-                      <a:endParaRPr lang="en-US" sz="1100">
+                      <a:endParaRPr lang="en-US" sz="1100" dirty="0">
                         <a:effectLst/>
                         <a:latin typeface="Calibri" panose="020F0502020204030204" pitchFamily="34" charset="0"/>
                         <a:ea typeface="Calibri" panose="020F0502020204030204" pitchFamily="34" charset="0"/>
@@ -7557,6 +6830,2176 @@
     <p:extLst>
       <p:ext uri="{BB962C8B-B14F-4D97-AF65-F5344CB8AC3E}">
         <p14:creationId xmlns:p14="http://schemas.microsoft.com/office/powerpoint/2010/main" val="3241547844"/>
+      </p:ext>
+    </p:extLst>
+  </p:cSld>
+  <p:clrMapOvr>
+    <a:masterClrMapping/>
+  </p:clrMapOvr>
+</p:sld>
+</file>
+
+<file path=ppt/slides/slide13.xml><?xml version="1.0" encoding="utf-8"?>
+<p:sld xmlns:a="http://schemas.openxmlformats.org/drawingml/2006/main" xmlns:r="http://schemas.openxmlformats.org/officeDocument/2006/relationships" xmlns:p="http://schemas.openxmlformats.org/presentationml/2006/main">
+  <p:cSld>
+    <p:spTree>
+      <p:nvGrpSpPr>
+        <p:cNvPr id="1" name=""/>
+        <p:cNvGrpSpPr/>
+        <p:nvPr/>
+      </p:nvGrpSpPr>
+      <p:grpSpPr>
+        <a:xfrm>
+          <a:off x="0" y="0"/>
+          <a:ext cx="0" cy="0"/>
+          <a:chOff x="0" y="0"/>
+          <a:chExt cx="0" cy="0"/>
+        </a:xfrm>
+      </p:grpSpPr>
+      <p:sp>
+        <p:nvSpPr>
+          <p:cNvPr id="2" name="Title 1">
+            <a:extLst>
+              <a:ext uri="{FF2B5EF4-FFF2-40B4-BE49-F238E27FC236}">
+                <a16:creationId xmlns:a16="http://schemas.microsoft.com/office/drawing/2014/main" id="{E08EC189-B582-4F74-9FE8-A516F8813C47}"/>
+              </a:ext>
+            </a:extLst>
+          </p:cNvPr>
+          <p:cNvSpPr>
+            <a:spLocks noGrp="1"/>
+          </p:cNvSpPr>
+          <p:nvPr>
+            <p:ph type="title"/>
+          </p:nvPr>
+        </p:nvSpPr>
+        <p:spPr>
+          <a:solidFill>
+            <a:schemeClr val="bg2"/>
+          </a:solidFill>
+        </p:spPr>
+        <p:txBody>
+          <a:bodyPr/>
+          <a:lstStyle/>
+          <a:p>
+            <a:r>
+              <a:rPr lang="en-US" dirty="0"/>
+              <a:t>Most Accurate Model</a:t>
+            </a:r>
+          </a:p>
+        </p:txBody>
+      </p:sp>
+      <p:sp>
+        <p:nvSpPr>
+          <p:cNvPr id="3" name="Content Placeholder 2">
+            <a:extLst>
+              <a:ext uri="{FF2B5EF4-FFF2-40B4-BE49-F238E27FC236}">
+                <a16:creationId xmlns:a16="http://schemas.microsoft.com/office/drawing/2014/main" id="{53B4F6B9-6E6C-4FD7-A9D0-825EE0A9148F}"/>
+              </a:ext>
+            </a:extLst>
+          </p:cNvPr>
+          <p:cNvSpPr>
+            <a:spLocks noGrp="1"/>
+          </p:cNvSpPr>
+          <p:nvPr>
+            <p:ph idx="1"/>
+          </p:nvPr>
+        </p:nvSpPr>
+        <p:spPr/>
+        <p:txBody>
+          <a:bodyPr>
+            <a:normAutofit/>
+          </a:bodyPr>
+          <a:lstStyle/>
+          <a:p>
+            <a:pPr lvl="1"/>
+            <a:r>
+              <a:rPr lang="en-US" dirty="0"/>
+              <a:t>Features</a:t>
+            </a:r>
+          </a:p>
+          <a:p>
+            <a:pPr lvl="2"/>
+            <a:r>
+              <a:rPr lang="en-US" dirty="0"/>
+              <a:t>Full-time Position, Prevailing Wage, SOC_NAME, Latitude, Longitude, County FIPS Code, County Population , State Code </a:t>
+            </a:r>
+          </a:p>
+          <a:p>
+            <a:pPr lvl="2"/>
+            <a:r>
+              <a:rPr lang="en-US" dirty="0"/>
+              <a:t>Excluded Census Block FIPS and Population</a:t>
+            </a:r>
+          </a:p>
+          <a:p>
+            <a:pPr lvl="1"/>
+            <a:r>
+              <a:rPr lang="en-US" dirty="0"/>
+              <a:t>Alpha – 1 </a:t>
+            </a:r>
+          </a:p>
+          <a:p>
+            <a:pPr lvl="1"/>
+            <a:r>
+              <a:rPr lang="en-US" dirty="0"/>
+              <a:t>Loss – hinge</a:t>
+            </a:r>
+          </a:p>
+          <a:p>
+            <a:pPr lvl="1"/>
+            <a:r>
+              <a:rPr lang="en-US" dirty="0"/>
+              <a:t>Maximum iterations – 5</a:t>
+            </a:r>
+          </a:p>
+          <a:p>
+            <a:pPr lvl="1"/>
+            <a:r>
+              <a:rPr lang="en-US" dirty="0"/>
+              <a:t>Penalty – L2</a:t>
+            </a:r>
+          </a:p>
+          <a:p>
+            <a:pPr lvl="1"/>
+            <a:r>
+              <a:rPr lang="en-US" dirty="0"/>
+              <a:t>Intercept was fit</a:t>
+            </a:r>
+          </a:p>
+          <a:p>
+            <a:pPr lvl="1"/>
+            <a:r>
+              <a:rPr lang="en-US" dirty="0"/>
+              <a:t>No balancing of class weights</a:t>
+            </a:r>
+          </a:p>
+          <a:p>
+            <a:pPr lvl="1"/>
+            <a:r>
+              <a:rPr lang="en-US" dirty="0"/>
+              <a:t>96.97% accurate</a:t>
+            </a:r>
+          </a:p>
+          <a:p>
+            <a:pPr lvl="1"/>
+            <a:endParaRPr lang="en-US" dirty="0"/>
+          </a:p>
+          <a:p>
+            <a:pPr lvl="1"/>
+            <a:endParaRPr lang="en-US" dirty="0"/>
+          </a:p>
+          <a:p>
+            <a:pPr lvl="1"/>
+            <a:endParaRPr lang="en-US" dirty="0"/>
+          </a:p>
+          <a:p>
+            <a:endParaRPr lang="en-US" dirty="0"/>
+          </a:p>
+        </p:txBody>
+      </p:sp>
+      <p:graphicFrame>
+        <p:nvGraphicFramePr>
+          <p:cNvPr id="4" name="Table 3">
+            <a:extLst>
+              <a:ext uri="{FF2B5EF4-FFF2-40B4-BE49-F238E27FC236}">
+                <a16:creationId xmlns:a16="http://schemas.microsoft.com/office/drawing/2014/main" id="{20CE6844-14CA-404D-8E30-439C91105017}"/>
+              </a:ext>
+            </a:extLst>
+          </p:cNvPr>
+          <p:cNvGraphicFramePr>
+            <a:graphicFrameLocks noGrp="1"/>
+          </p:cNvGraphicFramePr>
+          <p:nvPr>
+            <p:extLst>
+              <p:ext uri="{D42A27DB-BD31-4B8C-83A1-F6EECF244321}">
+                <p14:modId xmlns:p14="http://schemas.microsoft.com/office/powerpoint/2010/main" val="3601834185"/>
+              </p:ext>
+            </p:extLst>
+          </p:nvPr>
+        </p:nvGraphicFramePr>
+        <p:xfrm>
+          <a:off x="7007800" y="3821998"/>
+          <a:ext cx="3778992" cy="1112520"/>
+        </p:xfrm>
+        <a:graphic>
+          <a:graphicData uri="http://schemas.openxmlformats.org/drawingml/2006/table">
+            <a:tbl>
+              <a:tblPr firstRow="1" bandRow="1">
+                <a:tableStyleId>{5C22544A-7EE6-4342-B048-85BDC9FD1C3A}</a:tableStyleId>
+              </a:tblPr>
+              <a:tblGrid>
+                <a:gridCol w="1259664">
+                  <a:extLst>
+                    <a:ext uri="{9D8B030D-6E8A-4147-A177-3AD203B41FA5}">
+                      <a16:colId xmlns:a16="http://schemas.microsoft.com/office/drawing/2014/main" val="2185624774"/>
+                    </a:ext>
+                  </a:extLst>
+                </a:gridCol>
+                <a:gridCol w="1259664">
+                  <a:extLst>
+                    <a:ext uri="{9D8B030D-6E8A-4147-A177-3AD203B41FA5}">
+                      <a16:colId xmlns:a16="http://schemas.microsoft.com/office/drawing/2014/main" val="1899847989"/>
+                    </a:ext>
+                  </a:extLst>
+                </a:gridCol>
+                <a:gridCol w="1259664">
+                  <a:extLst>
+                    <a:ext uri="{9D8B030D-6E8A-4147-A177-3AD203B41FA5}">
+                      <a16:colId xmlns:a16="http://schemas.microsoft.com/office/drawing/2014/main" val="4213368424"/>
+                    </a:ext>
+                  </a:extLst>
+                </a:gridCol>
+              </a:tblGrid>
+              <a:tr h="370840">
+                <a:tc>
+                  <a:txBody>
+                    <a:bodyPr/>
+                    <a:lstStyle/>
+                    <a:p>
+                      <a:pPr algn="ctr"/>
+                      <a:endParaRPr lang="en-US" dirty="0"/>
+                    </a:p>
+                  </a:txBody>
+                  <a:tcPr/>
+                </a:tc>
+                <a:tc>
+                  <a:txBody>
+                    <a:bodyPr/>
+                    <a:lstStyle/>
+                    <a:p>
+                      <a:pPr algn="ctr"/>
+                      <a:r>
+                        <a:rPr lang="en-US" dirty="0"/>
+                        <a:t>Certified</a:t>
+                      </a:r>
+                    </a:p>
+                  </a:txBody>
+                  <a:tcPr/>
+                </a:tc>
+                <a:tc>
+                  <a:txBody>
+                    <a:bodyPr/>
+                    <a:lstStyle/>
+                    <a:p>
+                      <a:pPr algn="ctr"/>
+                      <a:r>
+                        <a:rPr lang="en-US" dirty="0"/>
+                        <a:t>Denied</a:t>
+                      </a:r>
+                    </a:p>
+                  </a:txBody>
+                  <a:tcPr/>
+                </a:tc>
+                <a:extLst>
+                  <a:ext uri="{0D108BD9-81ED-4DB2-BD59-A6C34878D82A}">
+                    <a16:rowId xmlns:a16="http://schemas.microsoft.com/office/drawing/2014/main" val="25577583"/>
+                  </a:ext>
+                </a:extLst>
+              </a:tr>
+              <a:tr h="370840">
+                <a:tc>
+                  <a:txBody>
+                    <a:bodyPr/>
+                    <a:lstStyle/>
+                    <a:p>
+                      <a:pPr algn="ctr"/>
+                      <a:r>
+                        <a:rPr lang="en-US" dirty="0"/>
+                        <a:t>Certified</a:t>
+                      </a:r>
+                    </a:p>
+                  </a:txBody>
+                  <a:tcPr/>
+                </a:tc>
+                <a:tc>
+                  <a:txBody>
+                    <a:bodyPr/>
+                    <a:lstStyle/>
+                    <a:p>
+                      <a:pPr algn="ctr"/>
+                      <a:r>
+                        <a:rPr lang="en-US" dirty="0"/>
+                        <a:t>676,348</a:t>
+                      </a:r>
+                    </a:p>
+                  </a:txBody>
+                  <a:tcPr/>
+                </a:tc>
+                <a:tc>
+                  <a:txBody>
+                    <a:bodyPr/>
+                    <a:lstStyle/>
+                    <a:p>
+                      <a:pPr algn="ctr"/>
+                      <a:r>
+                        <a:rPr lang="en-US" dirty="0"/>
+                        <a:t>0</a:t>
+                      </a:r>
+                    </a:p>
+                  </a:txBody>
+                  <a:tcPr/>
+                </a:tc>
+                <a:extLst>
+                  <a:ext uri="{0D108BD9-81ED-4DB2-BD59-A6C34878D82A}">
+                    <a16:rowId xmlns:a16="http://schemas.microsoft.com/office/drawing/2014/main" val="109509561"/>
+                  </a:ext>
+                </a:extLst>
+              </a:tr>
+              <a:tr h="370840">
+                <a:tc>
+                  <a:txBody>
+                    <a:bodyPr/>
+                    <a:lstStyle/>
+                    <a:p>
+                      <a:pPr algn="ctr"/>
+                      <a:r>
+                        <a:rPr lang="en-US" dirty="0"/>
+                        <a:t>Denied</a:t>
+                      </a:r>
+                    </a:p>
+                  </a:txBody>
+                  <a:tcPr/>
+                </a:tc>
+                <a:tc>
+                  <a:txBody>
+                    <a:bodyPr/>
+                    <a:lstStyle/>
+                    <a:p>
+                      <a:pPr algn="ctr"/>
+                      <a:r>
+                        <a:rPr lang="en-US" dirty="0"/>
+                        <a:t>21,163</a:t>
+                      </a:r>
+                    </a:p>
+                  </a:txBody>
+                  <a:tcPr/>
+                </a:tc>
+                <a:tc>
+                  <a:txBody>
+                    <a:bodyPr/>
+                    <a:lstStyle/>
+                    <a:p>
+                      <a:pPr algn="ctr"/>
+                      <a:r>
+                        <a:rPr lang="en-US" dirty="0"/>
+                        <a:t>4</a:t>
+                      </a:r>
+                    </a:p>
+                  </a:txBody>
+                  <a:tcPr/>
+                </a:tc>
+                <a:extLst>
+                  <a:ext uri="{0D108BD9-81ED-4DB2-BD59-A6C34878D82A}">
+                    <a16:rowId xmlns:a16="http://schemas.microsoft.com/office/drawing/2014/main" val="2953059719"/>
+                  </a:ext>
+                </a:extLst>
+              </a:tr>
+            </a:tbl>
+          </a:graphicData>
+        </a:graphic>
+      </p:graphicFrame>
+      <p:sp>
+        <p:nvSpPr>
+          <p:cNvPr id="5" name="TextBox 4">
+            <a:extLst>
+              <a:ext uri="{FF2B5EF4-FFF2-40B4-BE49-F238E27FC236}">
+                <a16:creationId xmlns:a16="http://schemas.microsoft.com/office/drawing/2014/main" id="{4DC1CF03-AEC9-4A2C-9B01-E1AC92E8C547}"/>
+              </a:ext>
+            </a:extLst>
+          </p:cNvPr>
+          <p:cNvSpPr txBox="1"/>
+          <p:nvPr/>
+        </p:nvSpPr>
+        <p:spPr>
+          <a:xfrm>
+            <a:off x="7998781" y="3429000"/>
+            <a:ext cx="1797030" cy="369332"/>
+          </a:xfrm>
+          <a:prstGeom prst="rect">
+            <a:avLst/>
+          </a:prstGeom>
+          <a:noFill/>
+        </p:spPr>
+        <p:txBody>
+          <a:bodyPr wrap="none" rtlCol="0">
+            <a:spAutoFit/>
+          </a:bodyPr>
+          <a:lstStyle/>
+          <a:p>
+            <a:r>
+              <a:rPr lang="en-US" dirty="0"/>
+              <a:t>Confusion Matrix</a:t>
+            </a:r>
+          </a:p>
+        </p:txBody>
+      </p:sp>
+    </p:spTree>
+    <p:extLst>
+      <p:ext uri="{BB962C8B-B14F-4D97-AF65-F5344CB8AC3E}">
+        <p14:creationId xmlns:p14="http://schemas.microsoft.com/office/powerpoint/2010/main" val="1558884581"/>
+      </p:ext>
+    </p:extLst>
+  </p:cSld>
+  <p:clrMapOvr>
+    <a:masterClrMapping/>
+  </p:clrMapOvr>
+</p:sld>
+</file>
+
+<file path=ppt/slides/slide14.xml><?xml version="1.0" encoding="utf-8"?>
+<p:sld xmlns:a="http://schemas.openxmlformats.org/drawingml/2006/main" xmlns:r="http://schemas.openxmlformats.org/officeDocument/2006/relationships" xmlns:p="http://schemas.openxmlformats.org/presentationml/2006/main">
+  <p:cSld>
+    <p:spTree>
+      <p:nvGrpSpPr>
+        <p:cNvPr id="1" name=""/>
+        <p:cNvGrpSpPr/>
+        <p:nvPr/>
+      </p:nvGrpSpPr>
+      <p:grpSpPr>
+        <a:xfrm>
+          <a:off x="0" y="0"/>
+          <a:ext cx="0" cy="0"/>
+          <a:chOff x="0" y="0"/>
+          <a:chExt cx="0" cy="0"/>
+        </a:xfrm>
+      </p:grpSpPr>
+      <p:sp>
+        <p:nvSpPr>
+          <p:cNvPr id="2" name="Title 1">
+            <a:extLst>
+              <a:ext uri="{FF2B5EF4-FFF2-40B4-BE49-F238E27FC236}">
+                <a16:creationId xmlns:a16="http://schemas.microsoft.com/office/drawing/2014/main" id="{E08EC189-B582-4F74-9FE8-A516F8813C47}"/>
+              </a:ext>
+            </a:extLst>
+          </p:cNvPr>
+          <p:cNvSpPr>
+            <a:spLocks noGrp="1"/>
+          </p:cNvSpPr>
+          <p:nvPr>
+            <p:ph type="title"/>
+          </p:nvPr>
+        </p:nvSpPr>
+        <p:spPr>
+          <a:xfrm>
+            <a:off x="838200" y="288925"/>
+            <a:ext cx="10515600" cy="1325563"/>
+          </a:xfrm>
+          <a:solidFill>
+            <a:schemeClr val="bg2"/>
+          </a:solidFill>
+        </p:spPr>
+        <p:txBody>
+          <a:bodyPr/>
+          <a:lstStyle/>
+          <a:p>
+            <a:r>
+              <a:rPr lang="en-US" dirty="0"/>
+              <a:t>t-SNE Plot</a:t>
+            </a:r>
+          </a:p>
+        </p:txBody>
+      </p:sp>
+      <p:sp>
+        <p:nvSpPr>
+          <p:cNvPr id="3" name="Content Placeholder 2">
+            <a:extLst>
+              <a:ext uri="{FF2B5EF4-FFF2-40B4-BE49-F238E27FC236}">
+                <a16:creationId xmlns:a16="http://schemas.microsoft.com/office/drawing/2014/main" id="{53B4F6B9-6E6C-4FD7-A9D0-825EE0A9148F}"/>
+              </a:ext>
+            </a:extLst>
+          </p:cNvPr>
+          <p:cNvSpPr>
+            <a:spLocks noGrp="1"/>
+          </p:cNvSpPr>
+          <p:nvPr>
+            <p:ph idx="1"/>
+          </p:nvPr>
+        </p:nvSpPr>
+        <p:spPr>
+          <a:xfrm>
+            <a:off x="1046243" y="2307496"/>
+            <a:ext cx="3814482" cy="3448517"/>
+          </a:xfrm>
+        </p:spPr>
+        <p:txBody>
+          <a:bodyPr>
+            <a:normAutofit/>
+          </a:bodyPr>
+          <a:lstStyle/>
+          <a:p>
+            <a:r>
+              <a:rPr lang="en-US" sz="2400" dirty="0"/>
+              <a:t>Model very bad at predicting denied applications</a:t>
+            </a:r>
+          </a:p>
+          <a:p>
+            <a:r>
+              <a:rPr lang="en-US" sz="2400" dirty="0"/>
+              <a:t>Reduce data to two dimensions using t-SNE to visualize</a:t>
+            </a:r>
+          </a:p>
+          <a:p>
+            <a:r>
+              <a:rPr lang="en-US" sz="2400" dirty="0"/>
+              <a:t>Certified and Denied overlap almost completely</a:t>
+            </a:r>
+          </a:p>
+          <a:p>
+            <a:pPr marL="0" indent="0">
+              <a:buNone/>
+            </a:pPr>
+            <a:endParaRPr lang="en-US" dirty="0"/>
+          </a:p>
+        </p:txBody>
+      </p:sp>
+      <p:pic>
+        <p:nvPicPr>
+          <p:cNvPr id="5" name="Picture 4">
+            <a:extLst>
+              <a:ext uri="{FF2B5EF4-FFF2-40B4-BE49-F238E27FC236}">
+                <a16:creationId xmlns:a16="http://schemas.microsoft.com/office/drawing/2014/main" id="{8DDCAF83-4D73-47F9-AFE5-0BCEBADD56C3}"/>
+              </a:ext>
+            </a:extLst>
+          </p:cNvPr>
+          <p:cNvPicPr>
+            <a:picLocks noChangeAspect="1"/>
+          </p:cNvPicPr>
+          <p:nvPr/>
+        </p:nvPicPr>
+        <p:blipFill>
+          <a:blip r:embed="rId2">
+            <a:extLst>
+              <a:ext uri="{28A0092B-C50C-407E-A947-70E740481C1C}">
+                <a14:useLocalDpi xmlns:a14="http://schemas.microsoft.com/office/drawing/2010/main" val="0"/>
+              </a:ext>
+            </a:extLst>
+          </a:blip>
+          <a:stretch>
+            <a:fillRect/>
+          </a:stretch>
+        </p:blipFill>
+        <p:spPr>
+          <a:xfrm>
+            <a:off x="5575090" y="1614488"/>
+            <a:ext cx="6043169" cy="4834535"/>
+          </a:xfrm>
+          <a:prstGeom prst="rect">
+            <a:avLst/>
+          </a:prstGeom>
+        </p:spPr>
+      </p:pic>
+    </p:spTree>
+    <p:extLst>
+      <p:ext uri="{BB962C8B-B14F-4D97-AF65-F5344CB8AC3E}">
+        <p14:creationId xmlns:p14="http://schemas.microsoft.com/office/powerpoint/2010/main" val="3999054109"/>
+      </p:ext>
+    </p:extLst>
+  </p:cSld>
+  <p:clrMapOvr>
+    <a:masterClrMapping/>
+  </p:clrMapOvr>
+</p:sld>
+</file>
+
+<file path=ppt/slides/slide15.xml><?xml version="1.0" encoding="utf-8"?>
+<p:sld xmlns:a="http://schemas.openxmlformats.org/drawingml/2006/main" xmlns:r="http://schemas.openxmlformats.org/officeDocument/2006/relationships" xmlns:p="http://schemas.openxmlformats.org/presentationml/2006/main">
+  <p:cSld>
+    <p:spTree>
+      <p:nvGrpSpPr>
+        <p:cNvPr id="1" name=""/>
+        <p:cNvGrpSpPr/>
+        <p:nvPr/>
+      </p:nvGrpSpPr>
+      <p:grpSpPr>
+        <a:xfrm>
+          <a:off x="0" y="0"/>
+          <a:ext cx="0" cy="0"/>
+          <a:chOff x="0" y="0"/>
+          <a:chExt cx="0" cy="0"/>
+        </a:xfrm>
+      </p:grpSpPr>
+      <p:sp>
+        <p:nvSpPr>
+          <p:cNvPr id="2" name="Title 1">
+            <a:extLst>
+              <a:ext uri="{FF2B5EF4-FFF2-40B4-BE49-F238E27FC236}">
+                <a16:creationId xmlns:a16="http://schemas.microsoft.com/office/drawing/2014/main" id="{E08EC189-B582-4F74-9FE8-A516F8813C47}"/>
+              </a:ext>
+            </a:extLst>
+          </p:cNvPr>
+          <p:cNvSpPr>
+            <a:spLocks noGrp="1"/>
+          </p:cNvSpPr>
+          <p:nvPr>
+            <p:ph type="title"/>
+          </p:nvPr>
+        </p:nvSpPr>
+        <p:spPr>
+          <a:solidFill>
+            <a:schemeClr val="bg2"/>
+          </a:solidFill>
+        </p:spPr>
+        <p:txBody>
+          <a:bodyPr/>
+          <a:lstStyle/>
+          <a:p>
+            <a:r>
+              <a:rPr lang="en-US" dirty="0"/>
+              <a:t>Conclusions</a:t>
+            </a:r>
+          </a:p>
+        </p:txBody>
+      </p:sp>
+      <p:sp>
+        <p:nvSpPr>
+          <p:cNvPr id="3" name="Content Placeholder 2">
+            <a:extLst>
+              <a:ext uri="{FF2B5EF4-FFF2-40B4-BE49-F238E27FC236}">
+                <a16:creationId xmlns:a16="http://schemas.microsoft.com/office/drawing/2014/main" id="{53B4F6B9-6E6C-4FD7-A9D0-825EE0A9148F}"/>
+              </a:ext>
+            </a:extLst>
+          </p:cNvPr>
+          <p:cNvSpPr>
+            <a:spLocks noGrp="1"/>
+          </p:cNvSpPr>
+          <p:nvPr>
+            <p:ph idx="1"/>
+          </p:nvPr>
+        </p:nvSpPr>
+        <p:spPr/>
+        <p:txBody>
+          <a:bodyPr>
+            <a:normAutofit lnSpcReduction="10000"/>
+          </a:bodyPr>
+          <a:lstStyle/>
+          <a:p>
+            <a:pPr lvl="1"/>
+            <a:r>
+              <a:rPr lang="en-US" dirty="0"/>
+              <a:t>Model essentially as good as a coin flip</a:t>
+            </a:r>
+          </a:p>
+          <a:p>
+            <a:pPr lvl="2"/>
+            <a:r>
+              <a:rPr lang="en-US" dirty="0"/>
+              <a:t>Model is 96.97% accurate</a:t>
+            </a:r>
+          </a:p>
+          <a:p>
+            <a:pPr lvl="2"/>
+            <a:r>
+              <a:rPr lang="en-US" dirty="0"/>
+              <a:t>Over 97.68% of LCAs are certified</a:t>
+            </a:r>
+          </a:p>
+          <a:p>
+            <a:pPr lvl="2"/>
+            <a:r>
+              <a:rPr lang="en-US" dirty="0"/>
+              <a:t>Bad at predicting denied applications</a:t>
+            </a:r>
+          </a:p>
+          <a:p>
+            <a:pPr lvl="2"/>
+            <a:endParaRPr lang="en-US" dirty="0"/>
+          </a:p>
+          <a:p>
+            <a:pPr lvl="1"/>
+            <a:r>
+              <a:rPr lang="en-US" dirty="0"/>
+              <a:t>How are applications scored in real life?</a:t>
+            </a:r>
+          </a:p>
+          <a:p>
+            <a:pPr marL="457200" lvl="1" indent="0">
+              <a:buNone/>
+            </a:pPr>
+            <a:endParaRPr lang="en-US" dirty="0"/>
+          </a:p>
+          <a:p>
+            <a:pPr lvl="1"/>
+            <a:r>
+              <a:rPr lang="en-US" dirty="0"/>
+              <a:t>Possible that I am missing information </a:t>
+            </a:r>
+          </a:p>
+          <a:p>
+            <a:pPr lvl="2"/>
+            <a:r>
+              <a:rPr lang="en-US" dirty="0"/>
+              <a:t>Is there something missing that informs denied applications</a:t>
+            </a:r>
+          </a:p>
+          <a:p>
+            <a:pPr lvl="1"/>
+            <a:endParaRPr lang="en-US" dirty="0"/>
+          </a:p>
+          <a:p>
+            <a:pPr lvl="1"/>
+            <a:r>
+              <a:rPr lang="en-US" dirty="0"/>
+              <a:t>Is completeness a factor?</a:t>
+            </a:r>
+          </a:p>
+          <a:p>
+            <a:pPr lvl="2"/>
+            <a:r>
+              <a:rPr lang="en-US" dirty="0"/>
+              <a:t>Are the fields I’m missing NULL for my denied records?</a:t>
+            </a:r>
+          </a:p>
+          <a:p>
+            <a:pPr lvl="2"/>
+            <a:endParaRPr lang="en-US" dirty="0"/>
+          </a:p>
+          <a:p>
+            <a:pPr lvl="1"/>
+            <a:endParaRPr lang="en-US" dirty="0"/>
+          </a:p>
+          <a:p>
+            <a:endParaRPr lang="en-US" dirty="0"/>
+          </a:p>
+        </p:txBody>
+      </p:sp>
+    </p:spTree>
+    <p:extLst>
+      <p:ext uri="{BB962C8B-B14F-4D97-AF65-F5344CB8AC3E}">
+        <p14:creationId xmlns:p14="http://schemas.microsoft.com/office/powerpoint/2010/main" val="3704780054"/>
+      </p:ext>
+    </p:extLst>
+  </p:cSld>
+  <p:clrMapOvr>
+    <a:masterClrMapping/>
+  </p:clrMapOvr>
+</p:sld>
+</file>
+
+<file path=ppt/slides/slide16.xml><?xml version="1.0" encoding="utf-8"?>
+<p:sld xmlns:a="http://schemas.openxmlformats.org/drawingml/2006/main" xmlns:r="http://schemas.openxmlformats.org/officeDocument/2006/relationships" xmlns:p="http://schemas.openxmlformats.org/presentationml/2006/main">
+  <p:cSld>
+    <p:spTree>
+      <p:nvGrpSpPr>
+        <p:cNvPr id="1" name=""/>
+        <p:cNvGrpSpPr/>
+        <p:nvPr/>
+      </p:nvGrpSpPr>
+      <p:grpSpPr>
+        <a:xfrm>
+          <a:off x="0" y="0"/>
+          <a:ext cx="0" cy="0"/>
+          <a:chOff x="0" y="0"/>
+          <a:chExt cx="0" cy="0"/>
+        </a:xfrm>
+      </p:grpSpPr>
+      <p:sp>
+        <p:nvSpPr>
+          <p:cNvPr id="2" name="Title 1">
+            <a:extLst>
+              <a:ext uri="{FF2B5EF4-FFF2-40B4-BE49-F238E27FC236}">
+                <a16:creationId xmlns:a16="http://schemas.microsoft.com/office/drawing/2014/main" id="{E08EC189-B582-4F74-9FE8-A516F8813C47}"/>
+              </a:ext>
+            </a:extLst>
+          </p:cNvPr>
+          <p:cNvSpPr>
+            <a:spLocks noGrp="1"/>
+          </p:cNvSpPr>
+          <p:nvPr>
+            <p:ph type="title"/>
+          </p:nvPr>
+        </p:nvSpPr>
+        <p:spPr>
+          <a:solidFill>
+            <a:schemeClr val="bg2"/>
+          </a:solidFill>
+        </p:spPr>
+        <p:txBody>
+          <a:bodyPr/>
+          <a:lstStyle/>
+          <a:p>
+            <a:r>
+              <a:rPr lang="en-US" dirty="0"/>
+              <a:t>Git Repository</a:t>
+            </a:r>
+          </a:p>
+        </p:txBody>
+      </p:sp>
+      <p:sp>
+        <p:nvSpPr>
+          <p:cNvPr id="3" name="Content Placeholder 2">
+            <a:extLst>
+              <a:ext uri="{FF2B5EF4-FFF2-40B4-BE49-F238E27FC236}">
+                <a16:creationId xmlns:a16="http://schemas.microsoft.com/office/drawing/2014/main" id="{53B4F6B9-6E6C-4FD7-A9D0-825EE0A9148F}"/>
+              </a:ext>
+            </a:extLst>
+          </p:cNvPr>
+          <p:cNvSpPr>
+            <a:spLocks noGrp="1"/>
+          </p:cNvSpPr>
+          <p:nvPr>
+            <p:ph idx="1"/>
+          </p:nvPr>
+        </p:nvSpPr>
+        <p:spPr/>
+        <p:txBody>
+          <a:bodyPr>
+            <a:normAutofit/>
+          </a:bodyPr>
+          <a:lstStyle/>
+          <a:p>
+            <a:pPr lvl="1"/>
+            <a:r>
+              <a:rPr lang="en-US" dirty="0"/>
+              <a:t>All code for this project can be found here:</a:t>
+            </a:r>
+          </a:p>
+          <a:p>
+            <a:pPr lvl="2"/>
+            <a:r>
+              <a:rPr lang="en-US" dirty="0">
+                <a:hlinkClick r:id="rId2"/>
+              </a:rPr>
+              <a:t>https://github.com/Liptoni/Springboard/tree/master/H1B_Capstone/python</a:t>
+            </a:r>
+            <a:r>
+              <a:rPr lang="en-US" dirty="0"/>
+              <a:t> </a:t>
+            </a:r>
+          </a:p>
+          <a:p>
+            <a:pPr lvl="1"/>
+            <a:endParaRPr lang="en-US" dirty="0"/>
+          </a:p>
+          <a:p>
+            <a:pPr lvl="1"/>
+            <a:endParaRPr lang="en-US" dirty="0"/>
+          </a:p>
+          <a:p>
+            <a:pPr lvl="2"/>
+            <a:endParaRPr lang="en-US" dirty="0"/>
+          </a:p>
+          <a:p>
+            <a:pPr lvl="1"/>
+            <a:endParaRPr lang="en-US" dirty="0"/>
+          </a:p>
+          <a:p>
+            <a:endParaRPr lang="en-US" dirty="0"/>
+          </a:p>
+        </p:txBody>
+      </p:sp>
+    </p:spTree>
+    <p:extLst>
+      <p:ext uri="{BB962C8B-B14F-4D97-AF65-F5344CB8AC3E}">
+        <p14:creationId xmlns:p14="http://schemas.microsoft.com/office/powerpoint/2010/main" val="3645738921"/>
+      </p:ext>
+    </p:extLst>
+  </p:cSld>
+  <p:clrMapOvr>
+    <a:masterClrMapping/>
+  </p:clrMapOvr>
+</p:sld>
+</file>
+
+<file path=ppt/slides/slide2.xml><?xml version="1.0" encoding="utf-8"?>
+<p:sld xmlns:a="http://schemas.openxmlformats.org/drawingml/2006/main" xmlns:r="http://schemas.openxmlformats.org/officeDocument/2006/relationships" xmlns:p="http://schemas.openxmlformats.org/presentationml/2006/main">
+  <p:cSld>
+    <p:spTree>
+      <p:nvGrpSpPr>
+        <p:cNvPr id="1" name=""/>
+        <p:cNvGrpSpPr/>
+        <p:nvPr/>
+      </p:nvGrpSpPr>
+      <p:grpSpPr>
+        <a:xfrm>
+          <a:off x="0" y="0"/>
+          <a:ext cx="0" cy="0"/>
+          <a:chOff x="0" y="0"/>
+          <a:chExt cx="0" cy="0"/>
+        </a:xfrm>
+      </p:grpSpPr>
+      <p:sp>
+        <p:nvSpPr>
+          <p:cNvPr id="2" name="Title 1">
+            <a:extLst>
+              <a:ext uri="{FF2B5EF4-FFF2-40B4-BE49-F238E27FC236}">
+                <a16:creationId xmlns:a16="http://schemas.microsoft.com/office/drawing/2014/main" id="{E08EC189-B582-4F74-9FE8-A516F8813C47}"/>
+              </a:ext>
+            </a:extLst>
+          </p:cNvPr>
+          <p:cNvSpPr>
+            <a:spLocks noGrp="1"/>
+          </p:cNvSpPr>
+          <p:nvPr>
+            <p:ph type="title"/>
+          </p:nvPr>
+        </p:nvSpPr>
+        <p:spPr>
+          <a:solidFill>
+            <a:schemeClr val="bg2"/>
+          </a:solidFill>
+        </p:spPr>
+        <p:txBody>
+          <a:bodyPr/>
+          <a:lstStyle/>
+          <a:p>
+            <a:r>
+              <a:rPr lang="en-US" dirty="0"/>
+              <a:t>Problem and Client</a:t>
+            </a:r>
+          </a:p>
+        </p:txBody>
+      </p:sp>
+      <p:sp>
+        <p:nvSpPr>
+          <p:cNvPr id="3" name="Content Placeholder 2">
+            <a:extLst>
+              <a:ext uri="{FF2B5EF4-FFF2-40B4-BE49-F238E27FC236}">
+                <a16:creationId xmlns:a16="http://schemas.microsoft.com/office/drawing/2014/main" id="{53B4F6B9-6E6C-4FD7-A9D0-825EE0A9148F}"/>
+              </a:ext>
+            </a:extLst>
+          </p:cNvPr>
+          <p:cNvSpPr>
+            <a:spLocks noGrp="1"/>
+          </p:cNvSpPr>
+          <p:nvPr>
+            <p:ph idx="1"/>
+          </p:nvPr>
+        </p:nvSpPr>
+        <p:spPr/>
+        <p:txBody>
+          <a:bodyPr>
+            <a:normAutofit fontScale="92500" lnSpcReduction="20000"/>
+          </a:bodyPr>
+          <a:lstStyle/>
+          <a:p>
+            <a:r>
+              <a:rPr lang="en-US" dirty="0"/>
+              <a:t>Predicting Labor Condition Application (LCA) success</a:t>
+            </a:r>
+          </a:p>
+          <a:p>
+            <a:pPr lvl="1" algn="ctr"/>
+            <a:r>
+              <a:rPr lang="en-US" dirty="0"/>
+              <a:t>Pre-requisite for final H1B visa application</a:t>
+            </a:r>
+          </a:p>
+          <a:p>
+            <a:r>
+              <a:rPr lang="en-US" dirty="0"/>
+              <a:t>Prospective Clients</a:t>
+            </a:r>
+          </a:p>
+          <a:p>
+            <a:pPr lvl="1"/>
+            <a:r>
+              <a:rPr lang="en-US" dirty="0"/>
+              <a:t>Foreign nationals hoping to secure a job</a:t>
+            </a:r>
+          </a:p>
+          <a:p>
+            <a:pPr lvl="1"/>
+            <a:r>
+              <a:rPr lang="en-US" dirty="0"/>
+              <a:t>Domestic companies hoping to sponsor a foreign born employee</a:t>
+            </a:r>
+          </a:p>
+          <a:p>
+            <a:pPr lvl="1"/>
+            <a:endParaRPr lang="en-US" dirty="0"/>
+          </a:p>
+          <a:p>
+            <a:r>
+              <a:rPr lang="en-US" dirty="0"/>
+              <a:t>Dataset</a:t>
+            </a:r>
+          </a:p>
+          <a:p>
+            <a:pPr lvl="1"/>
+            <a:r>
+              <a:rPr lang="en-US" dirty="0"/>
+              <a:t>US Department of Labor LCA petitions from 2011-2016</a:t>
+            </a:r>
+          </a:p>
+          <a:p>
+            <a:pPr lvl="2"/>
+            <a:r>
+              <a:rPr lang="en-US" dirty="0"/>
+              <a:t>N ~ 3 Million</a:t>
+            </a:r>
+          </a:p>
+          <a:p>
+            <a:pPr lvl="1"/>
+            <a:r>
+              <a:rPr lang="en-US" dirty="0"/>
+              <a:t>FCC Area API</a:t>
+            </a:r>
+          </a:p>
+          <a:p>
+            <a:pPr lvl="2"/>
+            <a:r>
+              <a:rPr lang="en-US" dirty="0"/>
+              <a:t>Census block populations</a:t>
+            </a:r>
+          </a:p>
+          <a:p>
+            <a:pPr lvl="1"/>
+            <a:r>
+              <a:rPr lang="en-US" dirty="0"/>
+              <a:t>Census Population Estimates API</a:t>
+            </a:r>
+          </a:p>
+          <a:p>
+            <a:pPr lvl="2"/>
+            <a:r>
+              <a:rPr lang="en-US" dirty="0"/>
+              <a:t>County Populations</a:t>
+            </a:r>
+          </a:p>
+        </p:txBody>
+      </p:sp>
+    </p:spTree>
+    <p:extLst>
+      <p:ext uri="{BB962C8B-B14F-4D97-AF65-F5344CB8AC3E}">
+        <p14:creationId xmlns:p14="http://schemas.microsoft.com/office/powerpoint/2010/main" val="802649709"/>
+      </p:ext>
+    </p:extLst>
+  </p:cSld>
+  <p:clrMapOvr>
+    <a:masterClrMapping/>
+  </p:clrMapOvr>
+</p:sld>
+</file>
+
+<file path=ppt/slides/slide3.xml><?xml version="1.0" encoding="utf-8"?>
+<p:sld xmlns:a="http://schemas.openxmlformats.org/drawingml/2006/main" xmlns:r="http://schemas.openxmlformats.org/officeDocument/2006/relationships" xmlns:p="http://schemas.openxmlformats.org/presentationml/2006/main">
+  <p:cSld>
+    <p:spTree>
+      <p:nvGrpSpPr>
+        <p:cNvPr id="1" name=""/>
+        <p:cNvGrpSpPr/>
+        <p:nvPr/>
+      </p:nvGrpSpPr>
+      <p:grpSpPr>
+        <a:xfrm>
+          <a:off x="0" y="0"/>
+          <a:ext cx="0" cy="0"/>
+          <a:chOff x="0" y="0"/>
+          <a:chExt cx="0" cy="0"/>
+        </a:xfrm>
+      </p:grpSpPr>
+      <p:sp>
+        <p:nvSpPr>
+          <p:cNvPr id="2" name="Title 1">
+            <a:extLst>
+              <a:ext uri="{FF2B5EF4-FFF2-40B4-BE49-F238E27FC236}">
+                <a16:creationId xmlns:a16="http://schemas.microsoft.com/office/drawing/2014/main" id="{E08EC189-B582-4F74-9FE8-A516F8813C47}"/>
+              </a:ext>
+            </a:extLst>
+          </p:cNvPr>
+          <p:cNvSpPr>
+            <a:spLocks noGrp="1"/>
+          </p:cNvSpPr>
+          <p:nvPr>
+            <p:ph type="title"/>
+          </p:nvPr>
+        </p:nvSpPr>
+        <p:spPr>
+          <a:xfrm>
+            <a:off x="838200" y="288925"/>
+            <a:ext cx="10515600" cy="1325563"/>
+          </a:xfrm>
+          <a:solidFill>
+            <a:schemeClr val="bg2"/>
+          </a:solidFill>
+        </p:spPr>
+        <p:txBody>
+          <a:bodyPr/>
+          <a:lstStyle/>
+          <a:p>
+            <a:r>
+              <a:rPr lang="en-US" dirty="0"/>
+              <a:t>Certified and Denied Applications</a:t>
+            </a:r>
+          </a:p>
+        </p:txBody>
+      </p:sp>
+      <p:sp>
+        <p:nvSpPr>
+          <p:cNvPr id="3" name="Content Placeholder 2">
+            <a:extLst>
+              <a:ext uri="{FF2B5EF4-FFF2-40B4-BE49-F238E27FC236}">
+                <a16:creationId xmlns:a16="http://schemas.microsoft.com/office/drawing/2014/main" id="{53B4F6B9-6E6C-4FD7-A9D0-825EE0A9148F}"/>
+              </a:ext>
+            </a:extLst>
+          </p:cNvPr>
+          <p:cNvSpPr>
+            <a:spLocks noGrp="1"/>
+          </p:cNvSpPr>
+          <p:nvPr>
+            <p:ph idx="1"/>
+          </p:nvPr>
+        </p:nvSpPr>
+        <p:spPr>
+          <a:xfrm>
+            <a:off x="838200" y="1825625"/>
+            <a:ext cx="2909047" cy="4351338"/>
+          </a:xfrm>
+        </p:spPr>
+        <p:txBody>
+          <a:bodyPr/>
+          <a:lstStyle/>
+          <a:p>
+            <a:r>
+              <a:rPr lang="en-US" dirty="0"/>
+              <a:t>Certified</a:t>
+            </a:r>
+          </a:p>
+          <a:p>
+            <a:pPr lvl="1"/>
+            <a:r>
+              <a:rPr lang="en-US" dirty="0"/>
+              <a:t>n = 2,818,282</a:t>
+            </a:r>
+          </a:p>
+          <a:p>
+            <a:r>
+              <a:rPr lang="en-US" dirty="0"/>
+              <a:t>Denied</a:t>
+            </a:r>
+          </a:p>
+          <a:p>
+            <a:pPr lvl="1"/>
+            <a:r>
+              <a:rPr lang="en-US" dirty="0"/>
+              <a:t>n = 94,346</a:t>
+            </a:r>
+          </a:p>
+          <a:p>
+            <a:r>
+              <a:rPr lang="en-US" dirty="0"/>
+              <a:t>Percent certified increased ever year</a:t>
+            </a:r>
+          </a:p>
+          <a:p>
+            <a:r>
+              <a:rPr lang="en-US" dirty="0"/>
+              <a:t>96.8% Certified in total</a:t>
+            </a:r>
+          </a:p>
+          <a:p>
+            <a:pPr marL="0" indent="0">
+              <a:buNone/>
+            </a:pPr>
+            <a:endParaRPr lang="en-US" dirty="0"/>
+          </a:p>
+        </p:txBody>
+      </p:sp>
+      <p:pic>
+        <p:nvPicPr>
+          <p:cNvPr id="5" name="Picture 4">
+            <a:extLst>
+              <a:ext uri="{FF2B5EF4-FFF2-40B4-BE49-F238E27FC236}">
+                <a16:creationId xmlns:a16="http://schemas.microsoft.com/office/drawing/2014/main" id="{8DDCAF83-4D73-47F9-AFE5-0BCEBADD56C3}"/>
+              </a:ext>
+            </a:extLst>
+          </p:cNvPr>
+          <p:cNvPicPr>
+            <a:picLocks noChangeAspect="1"/>
+          </p:cNvPicPr>
+          <p:nvPr/>
+        </p:nvPicPr>
+        <p:blipFill>
+          <a:blip r:embed="rId2">
+            <a:extLst>
+              <a:ext uri="{28A0092B-C50C-407E-A947-70E740481C1C}">
+                <a14:useLocalDpi xmlns:a14="http://schemas.microsoft.com/office/drawing/2010/main" val="0"/>
+              </a:ext>
+            </a:extLst>
+          </a:blip>
+          <a:stretch>
+            <a:fillRect/>
+          </a:stretch>
+        </p:blipFill>
+        <p:spPr>
+          <a:xfrm>
+            <a:off x="5031450" y="2213638"/>
+            <a:ext cx="5760731" cy="3575311"/>
+          </a:xfrm>
+          <a:prstGeom prst="rect">
+            <a:avLst/>
+          </a:prstGeom>
+        </p:spPr>
+      </p:pic>
+    </p:spTree>
+    <p:extLst>
+      <p:ext uri="{BB962C8B-B14F-4D97-AF65-F5344CB8AC3E}">
+        <p14:creationId xmlns:p14="http://schemas.microsoft.com/office/powerpoint/2010/main" val="2934126734"/>
+      </p:ext>
+    </p:extLst>
+  </p:cSld>
+  <p:clrMapOvr>
+    <a:masterClrMapping/>
+  </p:clrMapOvr>
+</p:sld>
+</file>
+
+<file path=ppt/slides/slide4.xml><?xml version="1.0" encoding="utf-8"?>
+<p:sld xmlns:a="http://schemas.openxmlformats.org/drawingml/2006/main" xmlns:r="http://schemas.openxmlformats.org/officeDocument/2006/relationships" xmlns:p="http://schemas.openxmlformats.org/presentationml/2006/main">
+  <p:cSld>
+    <p:spTree>
+      <p:nvGrpSpPr>
+        <p:cNvPr id="1" name=""/>
+        <p:cNvGrpSpPr/>
+        <p:nvPr/>
+      </p:nvGrpSpPr>
+      <p:grpSpPr>
+        <a:xfrm>
+          <a:off x="0" y="0"/>
+          <a:ext cx="0" cy="0"/>
+          <a:chOff x="0" y="0"/>
+          <a:chExt cx="0" cy="0"/>
+        </a:xfrm>
+      </p:grpSpPr>
+      <p:sp>
+        <p:nvSpPr>
+          <p:cNvPr id="2" name="Title 1">
+            <a:extLst>
+              <a:ext uri="{FF2B5EF4-FFF2-40B4-BE49-F238E27FC236}">
+                <a16:creationId xmlns:a16="http://schemas.microsoft.com/office/drawing/2014/main" id="{E08EC189-B582-4F74-9FE8-A516F8813C47}"/>
+              </a:ext>
+            </a:extLst>
+          </p:cNvPr>
+          <p:cNvSpPr>
+            <a:spLocks noGrp="1"/>
+          </p:cNvSpPr>
+          <p:nvPr>
+            <p:ph type="title"/>
+          </p:nvPr>
+        </p:nvSpPr>
+        <p:spPr>
+          <a:xfrm>
+            <a:off x="838200" y="288925"/>
+            <a:ext cx="10515600" cy="1325563"/>
+          </a:xfrm>
+          <a:solidFill>
+            <a:schemeClr val="bg2"/>
+          </a:solidFill>
+        </p:spPr>
+        <p:txBody>
+          <a:bodyPr/>
+          <a:lstStyle/>
+          <a:p>
+            <a:r>
+              <a:rPr lang="en-US" dirty="0"/>
+              <a:t>Certified and Denied Applications</a:t>
+            </a:r>
+          </a:p>
+        </p:txBody>
+      </p:sp>
+      <p:sp>
+        <p:nvSpPr>
+          <p:cNvPr id="3" name="Content Placeholder 2">
+            <a:extLst>
+              <a:ext uri="{FF2B5EF4-FFF2-40B4-BE49-F238E27FC236}">
+                <a16:creationId xmlns:a16="http://schemas.microsoft.com/office/drawing/2014/main" id="{53B4F6B9-6E6C-4FD7-A9D0-825EE0A9148F}"/>
+              </a:ext>
+            </a:extLst>
+          </p:cNvPr>
+          <p:cNvSpPr>
+            <a:spLocks noGrp="1"/>
+          </p:cNvSpPr>
+          <p:nvPr>
+            <p:ph idx="1"/>
+          </p:nvPr>
+        </p:nvSpPr>
+        <p:spPr>
+          <a:xfrm>
+            <a:off x="983490" y="2804365"/>
+            <a:ext cx="3814482" cy="1249269"/>
+          </a:xfrm>
+        </p:spPr>
+        <p:txBody>
+          <a:bodyPr/>
+          <a:lstStyle/>
+          <a:p>
+            <a:r>
+              <a:rPr lang="en-US" sz="2400" dirty="0"/>
+              <a:t>Prevailing Wage (non-zero)</a:t>
+            </a:r>
+          </a:p>
+          <a:p>
+            <a:pPr lvl="1"/>
+            <a:r>
+              <a:rPr lang="en-US" dirty="0"/>
+              <a:t>mean = $141,144</a:t>
+            </a:r>
+          </a:p>
+          <a:p>
+            <a:pPr lvl="1"/>
+            <a:r>
+              <a:rPr lang="en-US" dirty="0"/>
+              <a:t>median = $65,000</a:t>
+            </a:r>
+          </a:p>
+          <a:p>
+            <a:pPr marL="0" indent="0">
+              <a:buNone/>
+            </a:pPr>
+            <a:endParaRPr lang="en-US" dirty="0"/>
+          </a:p>
+        </p:txBody>
+      </p:sp>
+      <p:pic>
+        <p:nvPicPr>
+          <p:cNvPr id="5" name="Picture 4">
+            <a:extLst>
+              <a:ext uri="{FF2B5EF4-FFF2-40B4-BE49-F238E27FC236}">
+                <a16:creationId xmlns:a16="http://schemas.microsoft.com/office/drawing/2014/main" id="{8DDCAF83-4D73-47F9-AFE5-0BCEBADD56C3}"/>
+              </a:ext>
+            </a:extLst>
+          </p:cNvPr>
+          <p:cNvPicPr>
+            <a:picLocks noChangeAspect="1"/>
+          </p:cNvPicPr>
+          <p:nvPr/>
+        </p:nvPicPr>
+        <p:blipFill>
+          <a:blip r:embed="rId2">
+            <a:extLst>
+              <a:ext uri="{28A0092B-C50C-407E-A947-70E740481C1C}">
+                <a14:useLocalDpi xmlns:a14="http://schemas.microsoft.com/office/drawing/2010/main" val="0"/>
+              </a:ext>
+            </a:extLst>
+          </a:blip>
+          <a:stretch>
+            <a:fillRect/>
+          </a:stretch>
+        </p:blipFill>
+        <p:spPr>
+          <a:xfrm>
+            <a:off x="5580158" y="1827970"/>
+            <a:ext cx="5701924" cy="4113380"/>
+          </a:xfrm>
+          <a:prstGeom prst="rect">
+            <a:avLst/>
+          </a:prstGeom>
+        </p:spPr>
+      </p:pic>
+    </p:spTree>
+    <p:extLst>
+      <p:ext uri="{BB962C8B-B14F-4D97-AF65-F5344CB8AC3E}">
+        <p14:creationId xmlns:p14="http://schemas.microsoft.com/office/powerpoint/2010/main" val="3859874370"/>
+      </p:ext>
+    </p:extLst>
+  </p:cSld>
+  <p:clrMapOvr>
+    <a:masterClrMapping/>
+  </p:clrMapOvr>
+</p:sld>
+</file>
+
+<file path=ppt/slides/slide5.xml><?xml version="1.0" encoding="utf-8"?>
+<p:sld xmlns:a="http://schemas.openxmlformats.org/drawingml/2006/main" xmlns:r="http://schemas.openxmlformats.org/officeDocument/2006/relationships" xmlns:p="http://schemas.openxmlformats.org/presentationml/2006/main">
+  <p:cSld>
+    <p:spTree>
+      <p:nvGrpSpPr>
+        <p:cNvPr id="1" name=""/>
+        <p:cNvGrpSpPr/>
+        <p:nvPr/>
+      </p:nvGrpSpPr>
+      <p:grpSpPr>
+        <a:xfrm>
+          <a:off x="0" y="0"/>
+          <a:ext cx="0" cy="0"/>
+          <a:chOff x="0" y="0"/>
+          <a:chExt cx="0" cy="0"/>
+        </a:xfrm>
+      </p:grpSpPr>
+      <p:sp>
+        <p:nvSpPr>
+          <p:cNvPr id="2" name="Title 1">
+            <a:extLst>
+              <a:ext uri="{FF2B5EF4-FFF2-40B4-BE49-F238E27FC236}">
+                <a16:creationId xmlns:a16="http://schemas.microsoft.com/office/drawing/2014/main" id="{E08EC189-B582-4F74-9FE8-A516F8813C47}"/>
+              </a:ext>
+            </a:extLst>
+          </p:cNvPr>
+          <p:cNvSpPr>
+            <a:spLocks noGrp="1"/>
+          </p:cNvSpPr>
+          <p:nvPr>
+            <p:ph type="title"/>
+          </p:nvPr>
+        </p:nvSpPr>
+        <p:spPr>
+          <a:xfrm>
+            <a:off x="838200" y="288925"/>
+            <a:ext cx="10515600" cy="1325563"/>
+          </a:xfrm>
+          <a:solidFill>
+            <a:schemeClr val="bg2"/>
+          </a:solidFill>
+        </p:spPr>
+        <p:txBody>
+          <a:bodyPr/>
+          <a:lstStyle/>
+          <a:p>
+            <a:r>
+              <a:rPr lang="en-US" dirty="0"/>
+              <a:t>Part-time and Full-time Positions</a:t>
+            </a:r>
+          </a:p>
+        </p:txBody>
+      </p:sp>
+      <p:sp>
+        <p:nvSpPr>
+          <p:cNvPr id="3" name="Content Placeholder 2">
+            <a:extLst>
+              <a:ext uri="{FF2B5EF4-FFF2-40B4-BE49-F238E27FC236}">
+                <a16:creationId xmlns:a16="http://schemas.microsoft.com/office/drawing/2014/main" id="{53B4F6B9-6E6C-4FD7-A9D0-825EE0A9148F}"/>
+              </a:ext>
+            </a:extLst>
+          </p:cNvPr>
+          <p:cNvSpPr>
+            <a:spLocks noGrp="1"/>
+          </p:cNvSpPr>
+          <p:nvPr>
+            <p:ph idx="1"/>
+          </p:nvPr>
+        </p:nvSpPr>
+        <p:spPr>
+          <a:xfrm>
+            <a:off x="983490" y="2804365"/>
+            <a:ext cx="3814482" cy="1249269"/>
+          </a:xfrm>
+        </p:spPr>
+        <p:txBody>
+          <a:bodyPr/>
+          <a:lstStyle/>
+          <a:p>
+            <a:r>
+              <a:rPr lang="en-US" sz="2400" dirty="0"/>
+              <a:t>Full-time applications far outnumber part-time…</a:t>
+            </a:r>
+          </a:p>
+          <a:p>
+            <a:r>
+              <a:rPr lang="en-US" sz="2400" dirty="0"/>
+              <a:t>…Until 2016</a:t>
+            </a:r>
+          </a:p>
+          <a:p>
+            <a:endParaRPr lang="en-US" dirty="0"/>
+          </a:p>
+          <a:p>
+            <a:pPr marL="0" indent="0">
+              <a:buNone/>
+            </a:pPr>
+            <a:endParaRPr lang="en-US" dirty="0"/>
+          </a:p>
+        </p:txBody>
+      </p:sp>
+      <p:pic>
+        <p:nvPicPr>
+          <p:cNvPr id="5" name="Picture 4">
+            <a:extLst>
+              <a:ext uri="{FF2B5EF4-FFF2-40B4-BE49-F238E27FC236}">
+                <a16:creationId xmlns:a16="http://schemas.microsoft.com/office/drawing/2014/main" id="{8DDCAF83-4D73-47F9-AFE5-0BCEBADD56C3}"/>
+              </a:ext>
+            </a:extLst>
+          </p:cNvPr>
+          <p:cNvPicPr>
+            <a:picLocks noChangeAspect="1"/>
+          </p:cNvPicPr>
+          <p:nvPr/>
+        </p:nvPicPr>
+        <p:blipFill>
+          <a:blip r:embed="rId2">
+            <a:extLst>
+              <a:ext uri="{28A0092B-C50C-407E-A947-70E740481C1C}">
+                <a14:useLocalDpi xmlns:a14="http://schemas.microsoft.com/office/drawing/2010/main" val="0"/>
+              </a:ext>
+            </a:extLst>
+          </a:blip>
+          <a:stretch>
+            <a:fillRect/>
+          </a:stretch>
+        </p:blipFill>
+        <p:spPr>
+          <a:xfrm>
+            <a:off x="5109882" y="1827970"/>
+            <a:ext cx="5973530" cy="4113380"/>
+          </a:xfrm>
+          <a:prstGeom prst="rect">
+            <a:avLst/>
+          </a:prstGeom>
+        </p:spPr>
+      </p:pic>
+    </p:spTree>
+    <p:extLst>
+      <p:ext uri="{BB962C8B-B14F-4D97-AF65-F5344CB8AC3E}">
+        <p14:creationId xmlns:p14="http://schemas.microsoft.com/office/powerpoint/2010/main" val="2469504354"/>
+      </p:ext>
+    </p:extLst>
+  </p:cSld>
+  <p:clrMapOvr>
+    <a:masterClrMapping/>
+  </p:clrMapOvr>
+</p:sld>
+</file>
+
+<file path=ppt/slides/slide6.xml><?xml version="1.0" encoding="utf-8"?>
+<p:sld xmlns:a="http://schemas.openxmlformats.org/drawingml/2006/main" xmlns:r="http://schemas.openxmlformats.org/officeDocument/2006/relationships" xmlns:p="http://schemas.openxmlformats.org/presentationml/2006/main">
+  <p:cSld>
+    <p:spTree>
+      <p:nvGrpSpPr>
+        <p:cNvPr id="1" name=""/>
+        <p:cNvGrpSpPr/>
+        <p:nvPr/>
+      </p:nvGrpSpPr>
+      <p:grpSpPr>
+        <a:xfrm>
+          <a:off x="0" y="0"/>
+          <a:ext cx="0" cy="0"/>
+          <a:chOff x="0" y="0"/>
+          <a:chExt cx="0" cy="0"/>
+        </a:xfrm>
+      </p:grpSpPr>
+      <p:sp>
+        <p:nvSpPr>
+          <p:cNvPr id="2" name="Title 1">
+            <a:extLst>
+              <a:ext uri="{FF2B5EF4-FFF2-40B4-BE49-F238E27FC236}">
+                <a16:creationId xmlns:a16="http://schemas.microsoft.com/office/drawing/2014/main" id="{E08EC189-B582-4F74-9FE8-A516F8813C47}"/>
+              </a:ext>
+            </a:extLst>
+          </p:cNvPr>
+          <p:cNvSpPr>
+            <a:spLocks noGrp="1"/>
+          </p:cNvSpPr>
+          <p:nvPr>
+            <p:ph type="title"/>
+          </p:nvPr>
+        </p:nvSpPr>
+        <p:spPr>
+          <a:solidFill>
+            <a:schemeClr val="bg2"/>
+          </a:solidFill>
+        </p:spPr>
+        <p:txBody>
+          <a:bodyPr/>
+          <a:lstStyle/>
+          <a:p>
+            <a:r>
+              <a:rPr lang="en-US" dirty="0"/>
+              <a:t>Wages for Certified and Denied Applications</a:t>
+            </a:r>
+          </a:p>
+        </p:txBody>
+      </p:sp>
+      <p:sp>
+        <p:nvSpPr>
+          <p:cNvPr id="3" name="Content Placeholder 2">
+            <a:extLst>
+              <a:ext uri="{FF2B5EF4-FFF2-40B4-BE49-F238E27FC236}">
+                <a16:creationId xmlns:a16="http://schemas.microsoft.com/office/drawing/2014/main" id="{53B4F6B9-6E6C-4FD7-A9D0-825EE0A9148F}"/>
+              </a:ext>
+            </a:extLst>
+          </p:cNvPr>
+          <p:cNvSpPr>
+            <a:spLocks noGrp="1"/>
+          </p:cNvSpPr>
+          <p:nvPr>
+            <p:ph idx="1"/>
+          </p:nvPr>
+        </p:nvSpPr>
+        <p:spPr>
+          <a:xfrm>
+            <a:off x="838200" y="1825625"/>
+            <a:ext cx="5487650" cy="4351338"/>
+          </a:xfrm>
+        </p:spPr>
+        <p:txBody>
+          <a:bodyPr>
+            <a:normAutofit/>
+          </a:bodyPr>
+          <a:lstStyle/>
+          <a:p>
+            <a:r>
+              <a:rPr lang="en-US" dirty="0"/>
+              <a:t>Mean Wages</a:t>
+            </a:r>
+          </a:p>
+          <a:p>
+            <a:pPr lvl="1"/>
+            <a:r>
+              <a:rPr lang="en-US" dirty="0"/>
+              <a:t>Certified - $72,553 (n=2,818,282)</a:t>
+            </a:r>
+          </a:p>
+          <a:p>
+            <a:pPr lvl="1"/>
+            <a:r>
+              <a:rPr lang="en-US" dirty="0"/>
+              <a:t>Denied – $2160,933 (n=94265)</a:t>
+            </a:r>
+          </a:p>
+          <a:p>
+            <a:endParaRPr lang="en-US" dirty="0"/>
+          </a:p>
+          <a:p>
+            <a:r>
+              <a:rPr lang="en-US" dirty="0"/>
+              <a:t>Mean wage between certified and denied not equal</a:t>
+            </a:r>
+          </a:p>
+          <a:p>
+            <a:pPr lvl="1"/>
+            <a:r>
+              <a:rPr lang="en-US" dirty="0"/>
+              <a:t>p ≈ 0</a:t>
+            </a:r>
+          </a:p>
+          <a:p>
+            <a:pPr lvl="1"/>
+            <a:endParaRPr lang="en-US" dirty="0"/>
+          </a:p>
+          <a:p>
+            <a:endParaRPr lang="en-US" dirty="0"/>
+          </a:p>
+        </p:txBody>
+      </p:sp>
+      <p:pic>
+        <p:nvPicPr>
+          <p:cNvPr id="5" name="Picture 4">
+            <a:extLst>
+              <a:ext uri="{FF2B5EF4-FFF2-40B4-BE49-F238E27FC236}">
+                <a16:creationId xmlns:a16="http://schemas.microsoft.com/office/drawing/2014/main" id="{945ED71B-A258-491F-8315-9BC5EF3B508F}"/>
+              </a:ext>
+            </a:extLst>
+          </p:cNvPr>
+          <p:cNvPicPr>
+            <a:picLocks noChangeAspect="1"/>
+          </p:cNvPicPr>
+          <p:nvPr/>
+        </p:nvPicPr>
+        <p:blipFill>
+          <a:blip r:embed="rId2">
+            <a:extLst>
+              <a:ext uri="{28A0092B-C50C-407E-A947-70E740481C1C}">
+                <a14:useLocalDpi xmlns:a14="http://schemas.microsoft.com/office/drawing/2010/main" val="0"/>
+              </a:ext>
+            </a:extLst>
+          </a:blip>
+          <a:stretch>
+            <a:fillRect/>
+          </a:stretch>
+        </p:blipFill>
+        <p:spPr>
+          <a:xfrm>
+            <a:off x="6704350" y="2172077"/>
+            <a:ext cx="5487650" cy="3658433"/>
+          </a:xfrm>
+          <a:prstGeom prst="rect">
+            <a:avLst/>
+          </a:prstGeom>
+        </p:spPr>
+      </p:pic>
+    </p:spTree>
+    <p:extLst>
+      <p:ext uri="{BB962C8B-B14F-4D97-AF65-F5344CB8AC3E}">
+        <p14:creationId xmlns:p14="http://schemas.microsoft.com/office/powerpoint/2010/main" val="3537211095"/>
+      </p:ext>
+    </p:extLst>
+  </p:cSld>
+  <p:clrMapOvr>
+    <a:masterClrMapping/>
+  </p:clrMapOvr>
+</p:sld>
+</file>
+
+<file path=ppt/slides/slide7.xml><?xml version="1.0" encoding="utf-8"?>
+<p:sld xmlns:a="http://schemas.openxmlformats.org/drawingml/2006/main" xmlns:r="http://schemas.openxmlformats.org/officeDocument/2006/relationships" xmlns:p="http://schemas.openxmlformats.org/presentationml/2006/main">
+  <p:cSld>
+    <p:spTree>
+      <p:nvGrpSpPr>
+        <p:cNvPr id="1" name=""/>
+        <p:cNvGrpSpPr/>
+        <p:nvPr/>
+      </p:nvGrpSpPr>
+      <p:grpSpPr>
+        <a:xfrm>
+          <a:off x="0" y="0"/>
+          <a:ext cx="0" cy="0"/>
+          <a:chOff x="0" y="0"/>
+          <a:chExt cx="0" cy="0"/>
+        </a:xfrm>
+      </p:grpSpPr>
+      <p:sp>
+        <p:nvSpPr>
+          <p:cNvPr id="2" name="Title 1">
+            <a:extLst>
+              <a:ext uri="{FF2B5EF4-FFF2-40B4-BE49-F238E27FC236}">
+                <a16:creationId xmlns:a16="http://schemas.microsoft.com/office/drawing/2014/main" id="{E08EC189-B582-4F74-9FE8-A516F8813C47}"/>
+              </a:ext>
+            </a:extLst>
+          </p:cNvPr>
+          <p:cNvSpPr>
+            <a:spLocks noGrp="1"/>
+          </p:cNvSpPr>
+          <p:nvPr>
+            <p:ph type="title"/>
+          </p:nvPr>
+        </p:nvSpPr>
+        <p:spPr>
+          <a:xfrm>
+            <a:off x="838200" y="365125"/>
+            <a:ext cx="10515600" cy="1325563"/>
+          </a:xfrm>
+          <a:solidFill>
+            <a:schemeClr val="bg2"/>
+          </a:solidFill>
+        </p:spPr>
+        <p:txBody>
+          <a:bodyPr/>
+          <a:lstStyle/>
+          <a:p>
+            <a:r>
+              <a:rPr lang="en-US" dirty="0"/>
+              <a:t>Wages for Full- and Part-time Jobs</a:t>
+            </a:r>
+          </a:p>
+        </p:txBody>
+      </p:sp>
+      <p:sp>
+        <p:nvSpPr>
+          <p:cNvPr id="3" name="Content Placeholder 2">
+            <a:extLst>
+              <a:ext uri="{FF2B5EF4-FFF2-40B4-BE49-F238E27FC236}">
+                <a16:creationId xmlns:a16="http://schemas.microsoft.com/office/drawing/2014/main" id="{53B4F6B9-6E6C-4FD7-A9D0-825EE0A9148F}"/>
+              </a:ext>
+            </a:extLst>
+          </p:cNvPr>
+          <p:cNvSpPr>
+            <a:spLocks noGrp="1"/>
+          </p:cNvSpPr>
+          <p:nvPr>
+            <p:ph idx="1"/>
+          </p:nvPr>
+        </p:nvSpPr>
+        <p:spPr>
+          <a:xfrm>
+            <a:off x="838200" y="1825625"/>
+            <a:ext cx="5487650" cy="4351338"/>
+          </a:xfrm>
+        </p:spPr>
+        <p:txBody>
+          <a:bodyPr>
+            <a:normAutofit/>
+          </a:bodyPr>
+          <a:lstStyle/>
+          <a:p>
+            <a:r>
+              <a:rPr lang="en-US" dirty="0"/>
+              <a:t>Mean Wages</a:t>
+            </a:r>
+          </a:p>
+          <a:p>
+            <a:pPr lvl="1"/>
+            <a:r>
+              <a:rPr lang="en-US" dirty="0"/>
+              <a:t>Full-time – $155,125 (n = 2,501,021)</a:t>
+            </a:r>
+          </a:p>
+          <a:p>
+            <a:pPr lvl="1"/>
+            <a:r>
+              <a:rPr lang="en-US" dirty="0"/>
+              <a:t>Part-time – $68,549 (n = 411,528)</a:t>
+            </a:r>
+          </a:p>
+          <a:p>
+            <a:pPr lvl="1"/>
+            <a:endParaRPr lang="en-US" dirty="0"/>
+          </a:p>
+          <a:p>
+            <a:r>
+              <a:rPr lang="en-US" dirty="0"/>
+              <a:t>Mean wage between full-time and part-time positions not equal</a:t>
+            </a:r>
+          </a:p>
+          <a:p>
+            <a:pPr lvl="1"/>
+            <a:r>
+              <a:rPr lang="en-US" dirty="0"/>
+              <a:t>p ≈ 0</a:t>
+            </a:r>
+          </a:p>
+          <a:p>
+            <a:pPr lvl="1"/>
+            <a:endParaRPr lang="en-US" dirty="0"/>
+          </a:p>
+          <a:p>
+            <a:endParaRPr lang="en-US" dirty="0"/>
+          </a:p>
+        </p:txBody>
+      </p:sp>
+      <p:pic>
+        <p:nvPicPr>
+          <p:cNvPr id="5" name="Picture 4">
+            <a:extLst>
+              <a:ext uri="{FF2B5EF4-FFF2-40B4-BE49-F238E27FC236}">
+                <a16:creationId xmlns:a16="http://schemas.microsoft.com/office/drawing/2014/main" id="{945ED71B-A258-491F-8315-9BC5EF3B508F}"/>
+              </a:ext>
+            </a:extLst>
+          </p:cNvPr>
+          <p:cNvPicPr>
+            <a:picLocks noChangeAspect="1"/>
+          </p:cNvPicPr>
+          <p:nvPr/>
+        </p:nvPicPr>
+        <p:blipFill>
+          <a:blip r:embed="rId2">
+            <a:extLst>
+              <a:ext uri="{28A0092B-C50C-407E-A947-70E740481C1C}">
+                <a14:useLocalDpi xmlns:a14="http://schemas.microsoft.com/office/drawing/2010/main" val="0"/>
+              </a:ext>
+            </a:extLst>
+          </a:blip>
+          <a:stretch>
+            <a:fillRect/>
+          </a:stretch>
+        </p:blipFill>
+        <p:spPr>
+          <a:xfrm>
+            <a:off x="6704350" y="2172077"/>
+            <a:ext cx="5487650" cy="3658433"/>
+          </a:xfrm>
+          <a:prstGeom prst="rect">
+            <a:avLst/>
+          </a:prstGeom>
+        </p:spPr>
+      </p:pic>
+    </p:spTree>
+    <p:extLst>
+      <p:ext uri="{BB962C8B-B14F-4D97-AF65-F5344CB8AC3E}">
+        <p14:creationId xmlns:p14="http://schemas.microsoft.com/office/powerpoint/2010/main" val="3340265927"/>
+      </p:ext>
+    </p:extLst>
+  </p:cSld>
+  <p:clrMapOvr>
+    <a:masterClrMapping/>
+  </p:clrMapOvr>
+</p:sld>
+</file>
+
+<file path=ppt/slides/slide8.xml><?xml version="1.0" encoding="utf-8"?>
+<p:sld xmlns:a="http://schemas.openxmlformats.org/drawingml/2006/main" xmlns:r="http://schemas.openxmlformats.org/officeDocument/2006/relationships" xmlns:p="http://schemas.openxmlformats.org/presentationml/2006/main">
+  <p:cSld>
+    <p:spTree>
+      <p:nvGrpSpPr>
+        <p:cNvPr id="1" name=""/>
+        <p:cNvGrpSpPr/>
+        <p:nvPr/>
+      </p:nvGrpSpPr>
+      <p:grpSpPr>
+        <a:xfrm>
+          <a:off x="0" y="0"/>
+          <a:ext cx="0" cy="0"/>
+          <a:chOff x="0" y="0"/>
+          <a:chExt cx="0" cy="0"/>
+        </a:xfrm>
+      </p:grpSpPr>
+      <p:sp>
+        <p:nvSpPr>
+          <p:cNvPr id="2" name="Title 1">
+            <a:extLst>
+              <a:ext uri="{FF2B5EF4-FFF2-40B4-BE49-F238E27FC236}">
+                <a16:creationId xmlns:a16="http://schemas.microsoft.com/office/drawing/2014/main" id="{E08EC189-B582-4F74-9FE8-A516F8813C47}"/>
+              </a:ext>
+            </a:extLst>
+          </p:cNvPr>
+          <p:cNvSpPr>
+            <a:spLocks noGrp="1"/>
+          </p:cNvSpPr>
+          <p:nvPr>
+            <p:ph type="title"/>
+          </p:nvPr>
+        </p:nvSpPr>
+        <p:spPr>
+          <a:solidFill>
+            <a:schemeClr val="bg2"/>
+          </a:solidFill>
+        </p:spPr>
+        <p:txBody>
+          <a:bodyPr/>
+          <a:lstStyle/>
+          <a:p>
+            <a:r>
+              <a:rPr lang="en-US" dirty="0"/>
+              <a:t>County Population</a:t>
+            </a:r>
+          </a:p>
+        </p:txBody>
+      </p:sp>
+      <p:sp>
+        <p:nvSpPr>
+          <p:cNvPr id="3" name="Content Placeholder 2">
+            <a:extLst>
+              <a:ext uri="{FF2B5EF4-FFF2-40B4-BE49-F238E27FC236}">
+                <a16:creationId xmlns:a16="http://schemas.microsoft.com/office/drawing/2014/main" id="{53B4F6B9-6E6C-4FD7-A9D0-825EE0A9148F}"/>
+              </a:ext>
+            </a:extLst>
+          </p:cNvPr>
+          <p:cNvSpPr>
+            <a:spLocks noGrp="1"/>
+          </p:cNvSpPr>
+          <p:nvPr>
+            <p:ph idx="1"/>
+          </p:nvPr>
+        </p:nvSpPr>
+        <p:spPr>
+          <a:xfrm>
+            <a:off x="838200" y="1825625"/>
+            <a:ext cx="5487650" cy="4351338"/>
+          </a:xfrm>
+        </p:spPr>
+        <p:txBody>
+          <a:bodyPr>
+            <a:normAutofit/>
+          </a:bodyPr>
+          <a:lstStyle/>
+          <a:p>
+            <a:r>
+              <a:rPr lang="en-US" dirty="0"/>
+              <a:t>Mean Population</a:t>
+            </a:r>
+          </a:p>
+          <a:p>
+            <a:pPr lvl="1"/>
+            <a:r>
+              <a:rPr lang="en-US" dirty="0"/>
+              <a:t>Certified – 1,720,650 (n = 2,721,739)</a:t>
+            </a:r>
+          </a:p>
+          <a:p>
+            <a:pPr lvl="1"/>
+            <a:r>
+              <a:rPr lang="en-US" dirty="0"/>
+              <a:t>Denied – 85,107 (n = 85,107)</a:t>
+            </a:r>
+          </a:p>
+          <a:p>
+            <a:pPr lvl="1"/>
+            <a:endParaRPr lang="en-US" dirty="0"/>
+          </a:p>
+          <a:p>
+            <a:r>
+              <a:rPr lang="en-US" dirty="0"/>
+              <a:t>Mean county population for certified and denied not equal</a:t>
+            </a:r>
+          </a:p>
+          <a:p>
+            <a:pPr lvl="1"/>
+            <a:r>
+              <a:rPr lang="en-US" dirty="0"/>
+              <a:t>p ≈ 0</a:t>
+            </a:r>
+          </a:p>
+          <a:p>
+            <a:pPr lvl="1"/>
+            <a:endParaRPr lang="en-US" dirty="0"/>
+          </a:p>
+          <a:p>
+            <a:endParaRPr lang="en-US" dirty="0"/>
+          </a:p>
+        </p:txBody>
+      </p:sp>
+      <p:pic>
+        <p:nvPicPr>
+          <p:cNvPr id="5" name="Picture 4">
+            <a:extLst>
+              <a:ext uri="{FF2B5EF4-FFF2-40B4-BE49-F238E27FC236}">
+                <a16:creationId xmlns:a16="http://schemas.microsoft.com/office/drawing/2014/main" id="{945ED71B-A258-491F-8315-9BC5EF3B508F}"/>
+              </a:ext>
+            </a:extLst>
+          </p:cNvPr>
+          <p:cNvPicPr>
+            <a:picLocks noChangeAspect="1"/>
+          </p:cNvPicPr>
+          <p:nvPr/>
+        </p:nvPicPr>
+        <p:blipFill>
+          <a:blip r:embed="rId2">
+            <a:extLst>
+              <a:ext uri="{28A0092B-C50C-407E-A947-70E740481C1C}">
+                <a14:useLocalDpi xmlns:a14="http://schemas.microsoft.com/office/drawing/2010/main" val="0"/>
+              </a:ext>
+            </a:extLst>
+          </a:blip>
+          <a:stretch>
+            <a:fillRect/>
+          </a:stretch>
+        </p:blipFill>
+        <p:spPr>
+          <a:xfrm>
+            <a:off x="6704350" y="2172077"/>
+            <a:ext cx="5487650" cy="3658433"/>
+          </a:xfrm>
+          <a:prstGeom prst="rect">
+            <a:avLst/>
+          </a:prstGeom>
+        </p:spPr>
+      </p:pic>
+    </p:spTree>
+    <p:extLst>
+      <p:ext uri="{BB962C8B-B14F-4D97-AF65-F5344CB8AC3E}">
+        <p14:creationId xmlns:p14="http://schemas.microsoft.com/office/powerpoint/2010/main" val="3183579586"/>
+      </p:ext>
+    </p:extLst>
+  </p:cSld>
+  <p:clrMapOvr>
+    <a:masterClrMapping/>
+  </p:clrMapOvr>
+</p:sld>
+</file>
+
+<file path=ppt/slides/slide9.xml><?xml version="1.0" encoding="utf-8"?>
+<p:sld xmlns:a="http://schemas.openxmlformats.org/drawingml/2006/main" xmlns:r="http://schemas.openxmlformats.org/officeDocument/2006/relationships" xmlns:p="http://schemas.openxmlformats.org/presentationml/2006/main">
+  <p:cSld>
+    <p:spTree>
+      <p:nvGrpSpPr>
+        <p:cNvPr id="1" name=""/>
+        <p:cNvGrpSpPr/>
+        <p:nvPr/>
+      </p:nvGrpSpPr>
+      <p:grpSpPr>
+        <a:xfrm>
+          <a:off x="0" y="0"/>
+          <a:ext cx="0" cy="0"/>
+          <a:chOff x="0" y="0"/>
+          <a:chExt cx="0" cy="0"/>
+        </a:xfrm>
+      </p:grpSpPr>
+      <p:sp>
+        <p:nvSpPr>
+          <p:cNvPr id="2" name="Title 1">
+            <a:extLst>
+              <a:ext uri="{FF2B5EF4-FFF2-40B4-BE49-F238E27FC236}">
+                <a16:creationId xmlns:a16="http://schemas.microsoft.com/office/drawing/2014/main" id="{E08EC189-B582-4F74-9FE8-A516F8813C47}"/>
+              </a:ext>
+            </a:extLst>
+          </p:cNvPr>
+          <p:cNvSpPr>
+            <a:spLocks noGrp="1"/>
+          </p:cNvSpPr>
+          <p:nvPr>
+            <p:ph type="title"/>
+          </p:nvPr>
+        </p:nvSpPr>
+        <p:spPr>
+          <a:xfrm>
+            <a:off x="838200" y="288925"/>
+            <a:ext cx="10515600" cy="1325563"/>
+          </a:xfrm>
+          <a:solidFill>
+            <a:schemeClr val="bg2"/>
+          </a:solidFill>
+        </p:spPr>
+        <p:txBody>
+          <a:bodyPr/>
+          <a:lstStyle/>
+          <a:p>
+            <a:r>
+              <a:rPr lang="en-US" dirty="0"/>
+              <a:t>County Population vs. Wage Correlation</a:t>
+            </a:r>
+          </a:p>
+        </p:txBody>
+      </p:sp>
+      <p:sp>
+        <p:nvSpPr>
+          <p:cNvPr id="3" name="Content Placeholder 2">
+            <a:extLst>
+              <a:ext uri="{FF2B5EF4-FFF2-40B4-BE49-F238E27FC236}">
+                <a16:creationId xmlns:a16="http://schemas.microsoft.com/office/drawing/2014/main" id="{53B4F6B9-6E6C-4FD7-A9D0-825EE0A9148F}"/>
+              </a:ext>
+            </a:extLst>
+          </p:cNvPr>
+          <p:cNvSpPr>
+            <a:spLocks noGrp="1"/>
+          </p:cNvSpPr>
+          <p:nvPr>
+            <p:ph idx="1"/>
+          </p:nvPr>
+        </p:nvSpPr>
+        <p:spPr>
+          <a:xfrm>
+            <a:off x="983490" y="2804365"/>
+            <a:ext cx="3814482" cy="1249269"/>
+          </a:xfrm>
+        </p:spPr>
+        <p:txBody>
+          <a:bodyPr/>
+          <a:lstStyle/>
+          <a:p>
+            <a:r>
+              <a:rPr lang="en-US" sz="2400" dirty="0"/>
+              <a:t>Essentially no correlation between county population and wage</a:t>
+            </a:r>
+          </a:p>
+          <a:p>
+            <a:endParaRPr lang="en-US" dirty="0"/>
+          </a:p>
+          <a:p>
+            <a:pPr marL="0" indent="0">
+              <a:buNone/>
+            </a:pPr>
+            <a:endParaRPr lang="en-US" dirty="0"/>
+          </a:p>
+        </p:txBody>
+      </p:sp>
+      <p:pic>
+        <p:nvPicPr>
+          <p:cNvPr id="5" name="Picture 4">
+            <a:extLst>
+              <a:ext uri="{FF2B5EF4-FFF2-40B4-BE49-F238E27FC236}">
+                <a16:creationId xmlns:a16="http://schemas.microsoft.com/office/drawing/2014/main" id="{8DDCAF83-4D73-47F9-AFE5-0BCEBADD56C3}"/>
+              </a:ext>
+            </a:extLst>
+          </p:cNvPr>
+          <p:cNvPicPr>
+            <a:picLocks noChangeAspect="1"/>
+          </p:cNvPicPr>
+          <p:nvPr/>
+        </p:nvPicPr>
+        <p:blipFill>
+          <a:blip r:embed="rId2">
+            <a:extLst>
+              <a:ext uri="{28A0092B-C50C-407E-A947-70E740481C1C}">
+                <a14:useLocalDpi xmlns:a14="http://schemas.microsoft.com/office/drawing/2010/main" val="0"/>
+              </a:ext>
+            </a:extLst>
+          </a:blip>
+          <a:stretch>
+            <a:fillRect/>
+          </a:stretch>
+        </p:blipFill>
+        <p:spPr>
+          <a:xfrm>
+            <a:off x="5508759" y="1827970"/>
+            <a:ext cx="5175776" cy="4113380"/>
+          </a:xfrm>
+          <a:prstGeom prst="rect">
+            <a:avLst/>
+          </a:prstGeom>
+        </p:spPr>
+      </p:pic>
+    </p:spTree>
+    <p:extLst>
+      <p:ext uri="{BB962C8B-B14F-4D97-AF65-F5344CB8AC3E}">
+        <p14:creationId xmlns:p14="http://schemas.microsoft.com/office/powerpoint/2010/main" val="1229456136"/>
       </p:ext>
     </p:extLst>
   </p:cSld>

</xml_diff>